<commit_message>
Folien in Ganzens Thema eingepflegt
</commit_message>
<xml_diff>
--- a/DBI Präsentation Gruppe 2 - Ganzes Thema.pptx
+++ b/DBI Präsentation Gruppe 2 - Ganzes Thema.pptx
@@ -5,7 +5,7 @@
     <p:sldMasterId id="2147483648" r:id="rId1"/>
   </p:sldMasterIdLst>
   <p:notesMasterIdLst>
-    <p:notesMasterId r:id="rId28"/>
+    <p:notesMasterId r:id="rId35"/>
   </p:notesMasterIdLst>
   <p:sldIdLst>
     <p:sldId id="256" r:id="rId2"/>
@@ -34,6 +34,13 @@
     <p:sldId id="272" r:id="rId25"/>
     <p:sldId id="279" r:id="rId26"/>
     <p:sldId id="273" r:id="rId27"/>
+    <p:sldId id="284" r:id="rId28"/>
+    <p:sldId id="285" r:id="rId29"/>
+    <p:sldId id="286" r:id="rId30"/>
+    <p:sldId id="287" r:id="rId31"/>
+    <p:sldId id="288" r:id="rId32"/>
+    <p:sldId id="289" r:id="rId33"/>
+    <p:sldId id="290" r:id="rId34"/>
   </p:sldIdLst>
   <p:sldSz cx="12192000" cy="6858000"/>
   <p:notesSz cx="6858000" cy="9144000"/>
@@ -1741,6 +1748,594 @@
     <p:extLst>
       <p:ext uri="{BB962C8B-B14F-4D97-AF65-F5344CB8AC3E}">
         <p14:creationId xmlns:p14="http://schemas.microsoft.com/office/powerpoint/2010/main" val="3264197043"/>
+      </p:ext>
+    </p:extLst>
+  </p:cSld>
+  <p:clrMapOvr>
+    <a:masterClrMapping/>
+  </p:clrMapOvr>
+</p:notes>
+</file>
+
+<file path=ppt/notesSlides/notesSlide23.xml><?xml version="1.0" encoding="utf-8"?>
+<p:notes xmlns:a="http://schemas.openxmlformats.org/drawingml/2006/main" xmlns:r="http://schemas.openxmlformats.org/officeDocument/2006/relationships" xmlns:p="http://schemas.openxmlformats.org/presentationml/2006/main">
+  <p:cSld>
+    <p:spTree>
+      <p:nvGrpSpPr>
+        <p:cNvPr id="1" name=""/>
+        <p:cNvGrpSpPr/>
+        <p:nvPr/>
+      </p:nvGrpSpPr>
+      <p:grpSpPr>
+        <a:xfrm>
+          <a:off x="0" y="0"/>
+          <a:ext cx="0" cy="0"/>
+          <a:chOff x="0" y="0"/>
+          <a:chExt cx="0" cy="0"/>
+        </a:xfrm>
+      </p:grpSpPr>
+      <p:sp>
+        <p:nvSpPr>
+          <p:cNvPr id="2" name="Folienbildplatzhalter 1"/>
+          <p:cNvSpPr>
+            <a:spLocks noGrp="1" noRot="1" noChangeAspect="1"/>
+          </p:cNvSpPr>
+          <p:nvPr>
+            <p:ph type="sldImg"/>
+          </p:nvPr>
+        </p:nvSpPr>
+        <p:spPr/>
+      </p:sp>
+      <p:sp>
+        <p:nvSpPr>
+          <p:cNvPr id="3" name="Notizenplatzhalter 2"/>
+          <p:cNvSpPr>
+            <a:spLocks noGrp="1"/>
+          </p:cNvSpPr>
+          <p:nvPr>
+            <p:ph type="body" idx="1"/>
+          </p:nvPr>
+        </p:nvSpPr>
+        <p:spPr/>
+        <p:txBody>
+          <a:bodyPr/>
+          <a:lstStyle/>
+          <a:p>
+            <a:endParaRPr lang="en-US" dirty="0"/>
+          </a:p>
+        </p:txBody>
+      </p:sp>
+      <p:sp>
+        <p:nvSpPr>
+          <p:cNvPr id="4" name="Foliennummernplatzhalter 3"/>
+          <p:cNvSpPr>
+            <a:spLocks noGrp="1"/>
+          </p:cNvSpPr>
+          <p:nvPr>
+            <p:ph type="sldNum" sz="quarter" idx="5"/>
+          </p:nvPr>
+        </p:nvSpPr>
+        <p:spPr/>
+        <p:txBody>
+          <a:bodyPr/>
+          <a:lstStyle/>
+          <a:p>
+            <a:fld id="{4170B3C4-05EC-42BA-841C-F50750D38CCA}" type="slidenum">
+              <a:rPr lang="en-US" smtClean="0"/>
+              <a:t>27</a:t>
+            </a:fld>
+            <a:endParaRPr lang="en-US"/>
+          </a:p>
+        </p:txBody>
+      </p:sp>
+    </p:spTree>
+    <p:extLst>
+      <p:ext uri="{BB962C8B-B14F-4D97-AF65-F5344CB8AC3E}">
+        <p14:creationId xmlns:p14="http://schemas.microsoft.com/office/powerpoint/2010/main" val="3983359574"/>
+      </p:ext>
+    </p:extLst>
+  </p:cSld>
+  <p:clrMapOvr>
+    <a:masterClrMapping/>
+  </p:clrMapOvr>
+</p:notes>
+</file>
+
+<file path=ppt/notesSlides/notesSlide24.xml><?xml version="1.0" encoding="utf-8"?>
+<p:notes xmlns:a="http://schemas.openxmlformats.org/drawingml/2006/main" xmlns:r="http://schemas.openxmlformats.org/officeDocument/2006/relationships" xmlns:p="http://schemas.openxmlformats.org/presentationml/2006/main">
+  <p:cSld>
+    <p:spTree>
+      <p:nvGrpSpPr>
+        <p:cNvPr id="1" name=""/>
+        <p:cNvGrpSpPr/>
+        <p:nvPr/>
+      </p:nvGrpSpPr>
+      <p:grpSpPr>
+        <a:xfrm>
+          <a:off x="0" y="0"/>
+          <a:ext cx="0" cy="0"/>
+          <a:chOff x="0" y="0"/>
+          <a:chExt cx="0" cy="0"/>
+        </a:xfrm>
+      </p:grpSpPr>
+      <p:sp>
+        <p:nvSpPr>
+          <p:cNvPr id="2" name="Folienbildplatzhalter 1"/>
+          <p:cNvSpPr>
+            <a:spLocks noGrp="1" noRot="1" noChangeAspect="1"/>
+          </p:cNvSpPr>
+          <p:nvPr>
+            <p:ph type="sldImg"/>
+          </p:nvPr>
+        </p:nvSpPr>
+        <p:spPr/>
+      </p:sp>
+      <p:sp>
+        <p:nvSpPr>
+          <p:cNvPr id="3" name="Notizenplatzhalter 2"/>
+          <p:cNvSpPr>
+            <a:spLocks noGrp="1"/>
+          </p:cNvSpPr>
+          <p:nvPr>
+            <p:ph type="body" idx="1"/>
+          </p:nvPr>
+        </p:nvSpPr>
+        <p:spPr/>
+        <p:txBody>
+          <a:bodyPr/>
+          <a:lstStyle/>
+          <a:p>
+            <a:endParaRPr lang="de-AT" dirty="0"/>
+          </a:p>
+        </p:txBody>
+      </p:sp>
+      <p:sp>
+        <p:nvSpPr>
+          <p:cNvPr id="4" name="Foliennummernplatzhalter 3"/>
+          <p:cNvSpPr>
+            <a:spLocks noGrp="1"/>
+          </p:cNvSpPr>
+          <p:nvPr>
+            <p:ph type="sldNum" sz="quarter" idx="5"/>
+          </p:nvPr>
+        </p:nvSpPr>
+        <p:spPr/>
+        <p:txBody>
+          <a:bodyPr/>
+          <a:lstStyle/>
+          <a:p>
+            <a:fld id="{4170B3C4-05EC-42BA-841C-F50750D38CCA}" type="slidenum">
+              <a:rPr lang="en-US" smtClean="0"/>
+              <a:t>28</a:t>
+            </a:fld>
+            <a:endParaRPr lang="en-US"/>
+          </a:p>
+        </p:txBody>
+      </p:sp>
+    </p:spTree>
+    <p:extLst>
+      <p:ext uri="{BB962C8B-B14F-4D97-AF65-F5344CB8AC3E}">
+        <p14:creationId xmlns:p14="http://schemas.microsoft.com/office/powerpoint/2010/main" val="3184999763"/>
+      </p:ext>
+    </p:extLst>
+  </p:cSld>
+  <p:clrMapOvr>
+    <a:masterClrMapping/>
+  </p:clrMapOvr>
+</p:notes>
+</file>
+
+<file path=ppt/notesSlides/notesSlide25.xml><?xml version="1.0" encoding="utf-8"?>
+<p:notes xmlns:a="http://schemas.openxmlformats.org/drawingml/2006/main" xmlns:r="http://schemas.openxmlformats.org/officeDocument/2006/relationships" xmlns:p="http://schemas.openxmlformats.org/presentationml/2006/main">
+  <p:cSld>
+    <p:spTree>
+      <p:nvGrpSpPr>
+        <p:cNvPr id="1" name=""/>
+        <p:cNvGrpSpPr/>
+        <p:nvPr/>
+      </p:nvGrpSpPr>
+      <p:grpSpPr>
+        <a:xfrm>
+          <a:off x="0" y="0"/>
+          <a:ext cx="0" cy="0"/>
+          <a:chOff x="0" y="0"/>
+          <a:chExt cx="0" cy="0"/>
+        </a:xfrm>
+      </p:grpSpPr>
+      <p:sp>
+        <p:nvSpPr>
+          <p:cNvPr id="2" name="Folienbildplatzhalter 1"/>
+          <p:cNvSpPr>
+            <a:spLocks noGrp="1" noRot="1" noChangeAspect="1"/>
+          </p:cNvSpPr>
+          <p:nvPr>
+            <p:ph type="sldImg"/>
+          </p:nvPr>
+        </p:nvSpPr>
+        <p:spPr/>
+      </p:sp>
+      <p:sp>
+        <p:nvSpPr>
+          <p:cNvPr id="3" name="Notizenplatzhalter 2"/>
+          <p:cNvSpPr>
+            <a:spLocks noGrp="1"/>
+          </p:cNvSpPr>
+          <p:nvPr>
+            <p:ph type="body" idx="1"/>
+          </p:nvPr>
+        </p:nvSpPr>
+        <p:spPr/>
+        <p:txBody>
+          <a:bodyPr/>
+          <a:lstStyle/>
+          <a:p>
+            <a:endParaRPr lang="de-AT" dirty="0"/>
+          </a:p>
+        </p:txBody>
+      </p:sp>
+      <p:sp>
+        <p:nvSpPr>
+          <p:cNvPr id="4" name="Foliennummernplatzhalter 3"/>
+          <p:cNvSpPr>
+            <a:spLocks noGrp="1"/>
+          </p:cNvSpPr>
+          <p:nvPr>
+            <p:ph type="sldNum" sz="quarter" idx="5"/>
+          </p:nvPr>
+        </p:nvSpPr>
+        <p:spPr/>
+        <p:txBody>
+          <a:bodyPr/>
+          <a:lstStyle/>
+          <a:p>
+            <a:fld id="{4170B3C4-05EC-42BA-841C-F50750D38CCA}" type="slidenum">
+              <a:rPr lang="en-US" smtClean="0"/>
+              <a:t>29</a:t>
+            </a:fld>
+            <a:endParaRPr lang="en-US"/>
+          </a:p>
+        </p:txBody>
+      </p:sp>
+    </p:spTree>
+    <p:extLst>
+      <p:ext uri="{BB962C8B-B14F-4D97-AF65-F5344CB8AC3E}">
+        <p14:creationId xmlns:p14="http://schemas.microsoft.com/office/powerpoint/2010/main" val="1426269777"/>
+      </p:ext>
+    </p:extLst>
+  </p:cSld>
+  <p:clrMapOvr>
+    <a:masterClrMapping/>
+  </p:clrMapOvr>
+</p:notes>
+</file>
+
+<file path=ppt/notesSlides/notesSlide26.xml><?xml version="1.0" encoding="utf-8"?>
+<p:notes xmlns:a="http://schemas.openxmlformats.org/drawingml/2006/main" xmlns:r="http://schemas.openxmlformats.org/officeDocument/2006/relationships" xmlns:p="http://schemas.openxmlformats.org/presentationml/2006/main">
+  <p:cSld>
+    <p:spTree>
+      <p:nvGrpSpPr>
+        <p:cNvPr id="1" name=""/>
+        <p:cNvGrpSpPr/>
+        <p:nvPr/>
+      </p:nvGrpSpPr>
+      <p:grpSpPr>
+        <a:xfrm>
+          <a:off x="0" y="0"/>
+          <a:ext cx="0" cy="0"/>
+          <a:chOff x="0" y="0"/>
+          <a:chExt cx="0" cy="0"/>
+        </a:xfrm>
+      </p:grpSpPr>
+      <p:sp>
+        <p:nvSpPr>
+          <p:cNvPr id="2" name="Folienbildplatzhalter 1"/>
+          <p:cNvSpPr>
+            <a:spLocks noGrp="1" noRot="1" noChangeAspect="1"/>
+          </p:cNvSpPr>
+          <p:nvPr>
+            <p:ph type="sldImg"/>
+          </p:nvPr>
+        </p:nvSpPr>
+        <p:spPr/>
+      </p:sp>
+      <p:sp>
+        <p:nvSpPr>
+          <p:cNvPr id="3" name="Notizenplatzhalter 2"/>
+          <p:cNvSpPr>
+            <a:spLocks noGrp="1"/>
+          </p:cNvSpPr>
+          <p:nvPr>
+            <p:ph type="body" idx="1"/>
+          </p:nvPr>
+        </p:nvSpPr>
+        <p:spPr/>
+        <p:txBody>
+          <a:bodyPr/>
+          <a:lstStyle/>
+          <a:p>
+            <a:endParaRPr lang="en-US" dirty="0"/>
+          </a:p>
+        </p:txBody>
+      </p:sp>
+      <p:sp>
+        <p:nvSpPr>
+          <p:cNvPr id="4" name="Foliennummernplatzhalter 3"/>
+          <p:cNvSpPr>
+            <a:spLocks noGrp="1"/>
+          </p:cNvSpPr>
+          <p:nvPr>
+            <p:ph type="sldNum" sz="quarter" idx="5"/>
+          </p:nvPr>
+        </p:nvSpPr>
+        <p:spPr/>
+        <p:txBody>
+          <a:bodyPr/>
+          <a:lstStyle/>
+          <a:p>
+            <a:fld id="{4170B3C4-05EC-42BA-841C-F50750D38CCA}" type="slidenum">
+              <a:rPr lang="en-US" smtClean="0"/>
+              <a:t>30</a:t>
+            </a:fld>
+            <a:endParaRPr lang="en-US"/>
+          </a:p>
+        </p:txBody>
+      </p:sp>
+    </p:spTree>
+    <p:extLst>
+      <p:ext uri="{BB962C8B-B14F-4D97-AF65-F5344CB8AC3E}">
+        <p14:creationId xmlns:p14="http://schemas.microsoft.com/office/powerpoint/2010/main" val="3148690735"/>
+      </p:ext>
+    </p:extLst>
+  </p:cSld>
+  <p:clrMapOvr>
+    <a:masterClrMapping/>
+  </p:clrMapOvr>
+</p:notes>
+</file>
+
+<file path=ppt/notesSlides/notesSlide27.xml><?xml version="1.0" encoding="utf-8"?>
+<p:notes xmlns:a="http://schemas.openxmlformats.org/drawingml/2006/main" xmlns:r="http://schemas.openxmlformats.org/officeDocument/2006/relationships" xmlns:p="http://schemas.openxmlformats.org/presentationml/2006/main">
+  <p:cSld>
+    <p:spTree>
+      <p:nvGrpSpPr>
+        <p:cNvPr id="1" name=""/>
+        <p:cNvGrpSpPr/>
+        <p:nvPr/>
+      </p:nvGrpSpPr>
+      <p:grpSpPr>
+        <a:xfrm>
+          <a:off x="0" y="0"/>
+          <a:ext cx="0" cy="0"/>
+          <a:chOff x="0" y="0"/>
+          <a:chExt cx="0" cy="0"/>
+        </a:xfrm>
+      </p:grpSpPr>
+      <p:sp>
+        <p:nvSpPr>
+          <p:cNvPr id="2" name="Folienbildplatzhalter 1"/>
+          <p:cNvSpPr>
+            <a:spLocks noGrp="1" noRot="1" noChangeAspect="1"/>
+          </p:cNvSpPr>
+          <p:nvPr>
+            <p:ph type="sldImg"/>
+          </p:nvPr>
+        </p:nvSpPr>
+        <p:spPr/>
+      </p:sp>
+      <p:sp>
+        <p:nvSpPr>
+          <p:cNvPr id="3" name="Notizenplatzhalter 2"/>
+          <p:cNvSpPr>
+            <a:spLocks noGrp="1"/>
+          </p:cNvSpPr>
+          <p:nvPr>
+            <p:ph type="body" idx="1"/>
+          </p:nvPr>
+        </p:nvSpPr>
+        <p:spPr/>
+        <p:txBody>
+          <a:bodyPr/>
+          <a:lstStyle/>
+          <a:p>
+            <a:endParaRPr lang="en-US" dirty="0"/>
+          </a:p>
+        </p:txBody>
+      </p:sp>
+      <p:sp>
+        <p:nvSpPr>
+          <p:cNvPr id="4" name="Foliennummernplatzhalter 3"/>
+          <p:cNvSpPr>
+            <a:spLocks noGrp="1"/>
+          </p:cNvSpPr>
+          <p:nvPr>
+            <p:ph type="sldNum" sz="quarter" idx="5"/>
+          </p:nvPr>
+        </p:nvSpPr>
+        <p:spPr/>
+        <p:txBody>
+          <a:bodyPr/>
+          <a:lstStyle/>
+          <a:p>
+            <a:fld id="{4170B3C4-05EC-42BA-841C-F50750D38CCA}" type="slidenum">
+              <a:rPr lang="en-US" smtClean="0"/>
+              <a:t>31</a:t>
+            </a:fld>
+            <a:endParaRPr lang="en-US"/>
+          </a:p>
+        </p:txBody>
+      </p:sp>
+    </p:spTree>
+    <p:extLst>
+      <p:ext uri="{BB962C8B-B14F-4D97-AF65-F5344CB8AC3E}">
+        <p14:creationId xmlns:p14="http://schemas.microsoft.com/office/powerpoint/2010/main" val="1003416568"/>
+      </p:ext>
+    </p:extLst>
+  </p:cSld>
+  <p:clrMapOvr>
+    <a:masterClrMapping/>
+  </p:clrMapOvr>
+</p:notes>
+</file>
+
+<file path=ppt/notesSlides/notesSlide28.xml><?xml version="1.0" encoding="utf-8"?>
+<p:notes xmlns:a="http://schemas.openxmlformats.org/drawingml/2006/main" xmlns:r="http://schemas.openxmlformats.org/officeDocument/2006/relationships" xmlns:p="http://schemas.openxmlformats.org/presentationml/2006/main">
+  <p:cSld>
+    <p:spTree>
+      <p:nvGrpSpPr>
+        <p:cNvPr id="1" name=""/>
+        <p:cNvGrpSpPr/>
+        <p:nvPr/>
+      </p:nvGrpSpPr>
+      <p:grpSpPr>
+        <a:xfrm>
+          <a:off x="0" y="0"/>
+          <a:ext cx="0" cy="0"/>
+          <a:chOff x="0" y="0"/>
+          <a:chExt cx="0" cy="0"/>
+        </a:xfrm>
+      </p:grpSpPr>
+      <p:sp>
+        <p:nvSpPr>
+          <p:cNvPr id="2" name="Folienbildplatzhalter 1"/>
+          <p:cNvSpPr>
+            <a:spLocks noGrp="1" noRot="1" noChangeAspect="1"/>
+          </p:cNvSpPr>
+          <p:nvPr>
+            <p:ph type="sldImg"/>
+          </p:nvPr>
+        </p:nvSpPr>
+        <p:spPr/>
+      </p:sp>
+      <p:sp>
+        <p:nvSpPr>
+          <p:cNvPr id="3" name="Notizenplatzhalter 2"/>
+          <p:cNvSpPr>
+            <a:spLocks noGrp="1"/>
+          </p:cNvSpPr>
+          <p:nvPr>
+            <p:ph type="body" idx="1"/>
+          </p:nvPr>
+        </p:nvSpPr>
+        <p:spPr/>
+        <p:txBody>
+          <a:bodyPr/>
+          <a:lstStyle/>
+          <a:p>
+            <a:endParaRPr lang="en-US" dirty="0"/>
+          </a:p>
+        </p:txBody>
+      </p:sp>
+      <p:sp>
+        <p:nvSpPr>
+          <p:cNvPr id="4" name="Foliennummernplatzhalter 3"/>
+          <p:cNvSpPr>
+            <a:spLocks noGrp="1"/>
+          </p:cNvSpPr>
+          <p:nvPr>
+            <p:ph type="sldNum" sz="quarter" idx="5"/>
+          </p:nvPr>
+        </p:nvSpPr>
+        <p:spPr/>
+        <p:txBody>
+          <a:bodyPr/>
+          <a:lstStyle/>
+          <a:p>
+            <a:fld id="{4170B3C4-05EC-42BA-841C-F50750D38CCA}" type="slidenum">
+              <a:rPr lang="en-US" smtClean="0"/>
+              <a:t>32</a:t>
+            </a:fld>
+            <a:endParaRPr lang="en-US"/>
+          </a:p>
+        </p:txBody>
+      </p:sp>
+    </p:spTree>
+    <p:extLst>
+      <p:ext uri="{BB962C8B-B14F-4D97-AF65-F5344CB8AC3E}">
+        <p14:creationId xmlns:p14="http://schemas.microsoft.com/office/powerpoint/2010/main" val="72842020"/>
+      </p:ext>
+    </p:extLst>
+  </p:cSld>
+  <p:clrMapOvr>
+    <a:masterClrMapping/>
+  </p:clrMapOvr>
+</p:notes>
+</file>
+
+<file path=ppt/notesSlides/notesSlide29.xml><?xml version="1.0" encoding="utf-8"?>
+<p:notes xmlns:a="http://schemas.openxmlformats.org/drawingml/2006/main" xmlns:r="http://schemas.openxmlformats.org/officeDocument/2006/relationships" xmlns:p="http://schemas.openxmlformats.org/presentationml/2006/main">
+  <p:cSld>
+    <p:spTree>
+      <p:nvGrpSpPr>
+        <p:cNvPr id="1" name=""/>
+        <p:cNvGrpSpPr/>
+        <p:nvPr/>
+      </p:nvGrpSpPr>
+      <p:grpSpPr>
+        <a:xfrm>
+          <a:off x="0" y="0"/>
+          <a:ext cx="0" cy="0"/>
+          <a:chOff x="0" y="0"/>
+          <a:chExt cx="0" cy="0"/>
+        </a:xfrm>
+      </p:grpSpPr>
+      <p:sp>
+        <p:nvSpPr>
+          <p:cNvPr id="2" name="Folienbildplatzhalter 1"/>
+          <p:cNvSpPr>
+            <a:spLocks noGrp="1" noRot="1" noChangeAspect="1"/>
+          </p:cNvSpPr>
+          <p:nvPr>
+            <p:ph type="sldImg"/>
+          </p:nvPr>
+        </p:nvSpPr>
+        <p:spPr/>
+      </p:sp>
+      <p:sp>
+        <p:nvSpPr>
+          <p:cNvPr id="3" name="Notizenplatzhalter 2"/>
+          <p:cNvSpPr>
+            <a:spLocks noGrp="1"/>
+          </p:cNvSpPr>
+          <p:nvPr>
+            <p:ph type="body" idx="1"/>
+          </p:nvPr>
+        </p:nvSpPr>
+        <p:spPr/>
+        <p:txBody>
+          <a:bodyPr/>
+          <a:lstStyle/>
+          <a:p>
+            <a:endParaRPr lang="en-US" dirty="0"/>
+          </a:p>
+        </p:txBody>
+      </p:sp>
+      <p:sp>
+        <p:nvSpPr>
+          <p:cNvPr id="4" name="Foliennummernplatzhalter 3"/>
+          <p:cNvSpPr>
+            <a:spLocks noGrp="1"/>
+          </p:cNvSpPr>
+          <p:nvPr>
+            <p:ph type="sldNum" sz="quarter" idx="5"/>
+          </p:nvPr>
+        </p:nvSpPr>
+        <p:spPr/>
+        <p:txBody>
+          <a:bodyPr/>
+          <a:lstStyle/>
+          <a:p>
+            <a:fld id="{4170B3C4-05EC-42BA-841C-F50750D38CCA}" type="slidenum">
+              <a:rPr lang="en-US" smtClean="0"/>
+              <a:t>33</a:t>
+            </a:fld>
+            <a:endParaRPr lang="en-US"/>
+          </a:p>
+        </p:txBody>
+      </p:sp>
+    </p:spTree>
+    <p:extLst>
+      <p:ext uri="{BB962C8B-B14F-4D97-AF65-F5344CB8AC3E}">
+        <p14:creationId xmlns:p14="http://schemas.microsoft.com/office/powerpoint/2010/main" val="7023730"/>
       </p:ext>
     </p:extLst>
   </p:cSld>
@@ -12492,6 +13087,2006 @@
 </p:sld>
 </file>
 
+<file path=ppt/slides/slide27.xml><?xml version="1.0" encoding="utf-8"?>
+<p:sld xmlns:a="http://schemas.openxmlformats.org/drawingml/2006/main" xmlns:r="http://schemas.openxmlformats.org/officeDocument/2006/relationships" xmlns:p="http://schemas.openxmlformats.org/presentationml/2006/main">
+  <p:cSld>
+    <p:spTree>
+      <p:nvGrpSpPr>
+        <p:cNvPr id="1" name=""/>
+        <p:cNvGrpSpPr/>
+        <p:nvPr/>
+      </p:nvGrpSpPr>
+      <p:grpSpPr>
+        <a:xfrm>
+          <a:off x="0" y="0"/>
+          <a:ext cx="0" cy="0"/>
+          <a:chOff x="0" y="0"/>
+          <a:chExt cx="0" cy="0"/>
+        </a:xfrm>
+      </p:grpSpPr>
+      <p:sp>
+        <p:nvSpPr>
+          <p:cNvPr id="2" name="Titel 1">
+            <a:extLst>
+              <a:ext uri="{FF2B5EF4-FFF2-40B4-BE49-F238E27FC236}">
+                <a16:creationId xmlns:a16="http://schemas.microsoft.com/office/drawing/2014/main" id="{C2D3A08E-FDF3-C3C3-C8D1-A96F4B0C27CD}"/>
+              </a:ext>
+            </a:extLst>
+          </p:cNvPr>
+          <p:cNvSpPr>
+            <a:spLocks noGrp="1"/>
+          </p:cNvSpPr>
+          <p:nvPr>
+            <p:ph type="ctrTitle"/>
+          </p:nvPr>
+        </p:nvSpPr>
+        <p:spPr/>
+        <p:txBody>
+          <a:bodyPr>
+            <a:normAutofit fontScale="90000"/>
+          </a:bodyPr>
+          <a:lstStyle/>
+          <a:p>
+            <a:br>
+              <a:rPr lang="de-AT" dirty="0"/>
+            </a:br>
+            <a:r>
+              <a:rPr lang="de-AT" dirty="0"/>
+              <a:t>Gruppe 2</a:t>
+            </a:r>
+            <a:br>
+              <a:rPr lang="de-AT" dirty="0"/>
+            </a:br>
+            <a:r>
+              <a:rPr lang="de-AT" dirty="0" err="1"/>
+              <a:t>Paging</a:t>
+            </a:r>
+            <a:r>
+              <a:rPr lang="de-AT" dirty="0"/>
+              <a:t> (Teilergebnisse)</a:t>
+            </a:r>
+            <a:endParaRPr lang="en-US" dirty="0"/>
+          </a:p>
+        </p:txBody>
+      </p:sp>
+      <p:sp>
+        <p:nvSpPr>
+          <p:cNvPr id="3" name="Untertitel 2">
+            <a:extLst>
+              <a:ext uri="{FF2B5EF4-FFF2-40B4-BE49-F238E27FC236}">
+                <a16:creationId xmlns:a16="http://schemas.microsoft.com/office/drawing/2014/main" id="{A83B8A4D-8D8D-24E2-12B5-A5F7D4163BA1}"/>
+              </a:ext>
+            </a:extLst>
+          </p:cNvPr>
+          <p:cNvSpPr>
+            <a:spLocks noGrp="1"/>
+          </p:cNvSpPr>
+          <p:nvPr>
+            <p:ph type="subTitle" idx="1"/>
+          </p:nvPr>
+        </p:nvSpPr>
+        <p:spPr/>
+        <p:txBody>
+          <a:bodyPr/>
+          <a:lstStyle/>
+          <a:p>
+            <a:r>
+              <a:rPr lang="de-DE" sz="1800" dirty="0">
+                <a:solidFill>
+                  <a:srgbClr val="000000"/>
+                </a:solidFill>
+                <a:latin typeface="AppleSystemUIFont"/>
+              </a:rPr>
+              <a:t>Top-N-Zeilen</a:t>
+            </a:r>
+          </a:p>
+          <a:p>
+            <a:r>
+              <a:rPr lang="en-US" sz="1800" dirty="0">
+                <a:solidFill>
+                  <a:srgbClr val="000000"/>
+                </a:solidFill>
+                <a:latin typeface="AppleSystemUIFont"/>
+              </a:rPr>
+              <a:t>ROWNUM RN</a:t>
+            </a:r>
+          </a:p>
+          <a:p>
+            <a:r>
+              <a:rPr lang="en-US" sz="1800" dirty="0">
+                <a:solidFill>
+                  <a:srgbClr val="000000"/>
+                </a:solidFill>
+                <a:latin typeface="AppleSystemUIFont"/>
+              </a:rPr>
+              <a:t>OFFSET / FETCH FIRST</a:t>
+            </a:r>
+          </a:p>
+          <a:p>
+            <a:r>
+              <a:rPr lang="en-US" sz="1800" dirty="0">
+                <a:solidFill>
+                  <a:srgbClr val="000000"/>
+                </a:solidFill>
+                <a:latin typeface="AppleSystemUIFont"/>
+              </a:rPr>
+              <a:t>Window-</a:t>
+            </a:r>
+            <a:r>
+              <a:rPr lang="en-US" sz="1800" dirty="0" err="1">
+                <a:solidFill>
+                  <a:srgbClr val="000000"/>
+                </a:solidFill>
+                <a:latin typeface="AppleSystemUIFont"/>
+              </a:rPr>
+              <a:t>Funktionen</a:t>
+            </a:r>
+            <a:endParaRPr lang="en-US" dirty="0"/>
+          </a:p>
+        </p:txBody>
+      </p:sp>
+      <p:sp>
+        <p:nvSpPr>
+          <p:cNvPr id="4" name="Textfeld 3">
+            <a:extLst>
+              <a:ext uri="{FF2B5EF4-FFF2-40B4-BE49-F238E27FC236}">
+                <a16:creationId xmlns:a16="http://schemas.microsoft.com/office/drawing/2014/main" id="{F5B30C86-0763-FCA7-BC7F-A0523028E7FD}"/>
+              </a:ext>
+            </a:extLst>
+          </p:cNvPr>
+          <p:cNvSpPr txBox="1"/>
+          <p:nvPr/>
+        </p:nvSpPr>
+        <p:spPr>
+          <a:xfrm>
+            <a:off x="3540868" y="6303522"/>
+            <a:ext cx="10003276" cy="369332"/>
+          </a:xfrm>
+          <a:prstGeom prst="rect">
+            <a:avLst/>
+          </a:prstGeom>
+          <a:noFill/>
+        </p:spPr>
+        <p:txBody>
+          <a:bodyPr wrap="square" rtlCol="0">
+            <a:spAutoFit/>
+          </a:bodyPr>
+          <a:lstStyle/>
+          <a:p>
+            <a:r>
+              <a:rPr lang="de-AT" dirty="0"/>
+              <a:t>Bilder und Texte wurden aus SQL Performance </a:t>
+            </a:r>
+            <a:r>
+              <a:rPr lang="de-AT" dirty="0" err="1"/>
+              <a:t>Explained</a:t>
+            </a:r>
+            <a:r>
+              <a:rPr lang="de-AT" dirty="0"/>
+              <a:t> © Markus Winand übernommen</a:t>
+            </a:r>
+            <a:endParaRPr lang="en-US" dirty="0"/>
+          </a:p>
+        </p:txBody>
+      </p:sp>
+    </p:spTree>
+    <p:extLst>
+      <p:ext uri="{BB962C8B-B14F-4D97-AF65-F5344CB8AC3E}">
+        <p14:creationId xmlns:p14="http://schemas.microsoft.com/office/powerpoint/2010/main" val="1205575220"/>
+      </p:ext>
+    </p:extLst>
+  </p:cSld>
+  <p:clrMapOvr>
+    <a:masterClrMapping/>
+  </p:clrMapOvr>
+  <mc:AlternateContent xmlns:mc="http://schemas.openxmlformats.org/markup-compatibility/2006" xmlns:p14="http://schemas.microsoft.com/office/powerpoint/2010/main">
+    <mc:Choice Requires="p14">
+      <p:transition spd="slow" p14:dur="1500">
+        <p:split orient="vert"/>
+      </p:transition>
+    </mc:Choice>
+    <mc:Fallback xmlns="">
+      <p:transition spd="slow">
+        <p:split orient="vert"/>
+      </p:transition>
+    </mc:Fallback>
+  </mc:AlternateContent>
+  <p:timing>
+    <p:tnLst>
+      <p:par>
+        <p:cTn id="1" dur="indefinite" restart="never" nodeType="tmRoot">
+          <p:childTnLst>
+            <p:seq concurrent="1" nextAc="seek">
+              <p:cTn id="2" dur="indefinite" nodeType="mainSeq">
+                <p:childTnLst>
+                  <p:par>
+                    <p:cTn id="3" fill="hold">
+                      <p:stCondLst>
+                        <p:cond delay="indefinite"/>
+                        <p:cond evt="onBegin" delay="0">
+                          <p:tn val="2"/>
+                        </p:cond>
+                      </p:stCondLst>
+                      <p:childTnLst>
+                        <p:par>
+                          <p:cTn id="4" fill="hold">
+                            <p:stCondLst>
+                              <p:cond delay="0"/>
+                            </p:stCondLst>
+                            <p:childTnLst>
+                              <p:par>
+                                <p:cTn id="5" presetID="31" presetClass="entr" presetSubtype="0" fill="hold" grpId="0" nodeType="withEffect">
+                                  <p:stCondLst>
+                                    <p:cond delay="0"/>
+                                  </p:stCondLst>
+                                  <p:childTnLst>
+                                    <p:set>
+                                      <p:cBhvr>
+                                        <p:cTn id="6" dur="1" fill="hold">
+                                          <p:stCondLst>
+                                            <p:cond delay="0"/>
+                                          </p:stCondLst>
+                                        </p:cTn>
+                                        <p:tgtEl>
+                                          <p:spTgt spid="2"/>
+                                        </p:tgtEl>
+                                        <p:attrNameLst>
+                                          <p:attrName>style.visibility</p:attrName>
+                                        </p:attrNameLst>
+                                      </p:cBhvr>
+                                      <p:to>
+                                        <p:strVal val="visible"/>
+                                      </p:to>
+                                    </p:set>
+                                    <p:anim calcmode="lin" valueType="num">
+                                      <p:cBhvr>
+                                        <p:cTn id="7" dur="1000" fill="hold"/>
+                                        <p:tgtEl>
+                                          <p:spTgt spid="2"/>
+                                        </p:tgtEl>
+                                        <p:attrNameLst>
+                                          <p:attrName>ppt_w</p:attrName>
+                                        </p:attrNameLst>
+                                      </p:cBhvr>
+                                      <p:tavLst>
+                                        <p:tav tm="0">
+                                          <p:val>
+                                            <p:fltVal val="0"/>
+                                          </p:val>
+                                        </p:tav>
+                                        <p:tav tm="100000">
+                                          <p:val>
+                                            <p:strVal val="#ppt_w"/>
+                                          </p:val>
+                                        </p:tav>
+                                      </p:tavLst>
+                                    </p:anim>
+                                    <p:anim calcmode="lin" valueType="num">
+                                      <p:cBhvr>
+                                        <p:cTn id="8" dur="1000" fill="hold"/>
+                                        <p:tgtEl>
+                                          <p:spTgt spid="2"/>
+                                        </p:tgtEl>
+                                        <p:attrNameLst>
+                                          <p:attrName>ppt_h</p:attrName>
+                                        </p:attrNameLst>
+                                      </p:cBhvr>
+                                      <p:tavLst>
+                                        <p:tav tm="0">
+                                          <p:val>
+                                            <p:fltVal val="0"/>
+                                          </p:val>
+                                        </p:tav>
+                                        <p:tav tm="100000">
+                                          <p:val>
+                                            <p:strVal val="#ppt_h"/>
+                                          </p:val>
+                                        </p:tav>
+                                      </p:tavLst>
+                                    </p:anim>
+                                    <p:anim calcmode="lin" valueType="num">
+                                      <p:cBhvr>
+                                        <p:cTn id="9" dur="1000" fill="hold"/>
+                                        <p:tgtEl>
+                                          <p:spTgt spid="2"/>
+                                        </p:tgtEl>
+                                        <p:attrNameLst>
+                                          <p:attrName>style.rotation</p:attrName>
+                                        </p:attrNameLst>
+                                      </p:cBhvr>
+                                      <p:tavLst>
+                                        <p:tav tm="0">
+                                          <p:val>
+                                            <p:fltVal val="90"/>
+                                          </p:val>
+                                        </p:tav>
+                                        <p:tav tm="100000">
+                                          <p:val>
+                                            <p:fltVal val="0"/>
+                                          </p:val>
+                                        </p:tav>
+                                      </p:tavLst>
+                                    </p:anim>
+                                    <p:animEffect transition="in" filter="fade">
+                                      <p:cBhvr>
+                                        <p:cTn id="10" dur="1000"/>
+                                        <p:tgtEl>
+                                          <p:spTgt spid="2"/>
+                                        </p:tgtEl>
+                                      </p:cBhvr>
+                                    </p:animEffect>
+                                  </p:childTnLst>
+                                </p:cTn>
+                              </p:par>
+                            </p:childTnLst>
+                          </p:cTn>
+                        </p:par>
+                        <p:par>
+                          <p:cTn id="11" fill="hold">
+                            <p:stCondLst>
+                              <p:cond delay="1000"/>
+                            </p:stCondLst>
+                            <p:childTnLst>
+                              <p:par>
+                                <p:cTn id="12" presetID="31" presetClass="entr" presetSubtype="0" fill="hold" grpId="0" nodeType="afterEffect">
+                                  <p:stCondLst>
+                                    <p:cond delay="1000"/>
+                                  </p:stCondLst>
+                                  <p:childTnLst>
+                                    <p:set>
+                                      <p:cBhvr>
+                                        <p:cTn id="13" dur="1" fill="hold">
+                                          <p:stCondLst>
+                                            <p:cond delay="0"/>
+                                          </p:stCondLst>
+                                        </p:cTn>
+                                        <p:tgtEl>
+                                          <p:spTgt spid="3">
+                                            <p:txEl>
+                                              <p:pRg st="0" end="0"/>
+                                            </p:txEl>
+                                          </p:spTgt>
+                                        </p:tgtEl>
+                                        <p:attrNameLst>
+                                          <p:attrName>style.visibility</p:attrName>
+                                        </p:attrNameLst>
+                                      </p:cBhvr>
+                                      <p:to>
+                                        <p:strVal val="visible"/>
+                                      </p:to>
+                                    </p:set>
+                                    <p:anim calcmode="lin" valueType="num">
+                                      <p:cBhvr>
+                                        <p:cTn id="14" dur="1000" fill="hold"/>
+                                        <p:tgtEl>
+                                          <p:spTgt spid="3">
+                                            <p:txEl>
+                                              <p:pRg st="0" end="0"/>
+                                            </p:txEl>
+                                          </p:spTgt>
+                                        </p:tgtEl>
+                                        <p:attrNameLst>
+                                          <p:attrName>ppt_w</p:attrName>
+                                        </p:attrNameLst>
+                                      </p:cBhvr>
+                                      <p:tavLst>
+                                        <p:tav tm="0">
+                                          <p:val>
+                                            <p:fltVal val="0"/>
+                                          </p:val>
+                                        </p:tav>
+                                        <p:tav tm="100000">
+                                          <p:val>
+                                            <p:strVal val="#ppt_w"/>
+                                          </p:val>
+                                        </p:tav>
+                                      </p:tavLst>
+                                    </p:anim>
+                                    <p:anim calcmode="lin" valueType="num">
+                                      <p:cBhvr>
+                                        <p:cTn id="15" dur="1000" fill="hold"/>
+                                        <p:tgtEl>
+                                          <p:spTgt spid="3">
+                                            <p:txEl>
+                                              <p:pRg st="0" end="0"/>
+                                            </p:txEl>
+                                          </p:spTgt>
+                                        </p:tgtEl>
+                                        <p:attrNameLst>
+                                          <p:attrName>ppt_h</p:attrName>
+                                        </p:attrNameLst>
+                                      </p:cBhvr>
+                                      <p:tavLst>
+                                        <p:tav tm="0">
+                                          <p:val>
+                                            <p:fltVal val="0"/>
+                                          </p:val>
+                                        </p:tav>
+                                        <p:tav tm="100000">
+                                          <p:val>
+                                            <p:strVal val="#ppt_h"/>
+                                          </p:val>
+                                        </p:tav>
+                                      </p:tavLst>
+                                    </p:anim>
+                                    <p:anim calcmode="lin" valueType="num">
+                                      <p:cBhvr>
+                                        <p:cTn id="16" dur="1000" fill="hold"/>
+                                        <p:tgtEl>
+                                          <p:spTgt spid="3">
+                                            <p:txEl>
+                                              <p:pRg st="0" end="0"/>
+                                            </p:txEl>
+                                          </p:spTgt>
+                                        </p:tgtEl>
+                                        <p:attrNameLst>
+                                          <p:attrName>style.rotation</p:attrName>
+                                        </p:attrNameLst>
+                                      </p:cBhvr>
+                                      <p:tavLst>
+                                        <p:tav tm="0">
+                                          <p:val>
+                                            <p:fltVal val="90"/>
+                                          </p:val>
+                                        </p:tav>
+                                        <p:tav tm="100000">
+                                          <p:val>
+                                            <p:fltVal val="0"/>
+                                          </p:val>
+                                        </p:tav>
+                                      </p:tavLst>
+                                    </p:anim>
+                                    <p:animEffect transition="in" filter="fade">
+                                      <p:cBhvr>
+                                        <p:cTn id="17" dur="1000"/>
+                                        <p:tgtEl>
+                                          <p:spTgt spid="3">
+                                            <p:txEl>
+                                              <p:pRg st="0" end="0"/>
+                                            </p:txEl>
+                                          </p:spTgt>
+                                        </p:tgtEl>
+                                      </p:cBhvr>
+                                    </p:animEffect>
+                                  </p:childTnLst>
+                                </p:cTn>
+                              </p:par>
+                            </p:childTnLst>
+                          </p:cTn>
+                        </p:par>
+                        <p:par>
+                          <p:cTn id="18" fill="hold">
+                            <p:stCondLst>
+                              <p:cond delay="3000"/>
+                            </p:stCondLst>
+                            <p:childTnLst>
+                              <p:par>
+                                <p:cTn id="19" presetID="31" presetClass="entr" presetSubtype="0" fill="hold" grpId="0" nodeType="afterEffect">
+                                  <p:stCondLst>
+                                    <p:cond delay="1000"/>
+                                  </p:stCondLst>
+                                  <p:childTnLst>
+                                    <p:set>
+                                      <p:cBhvr>
+                                        <p:cTn id="20" dur="1" fill="hold">
+                                          <p:stCondLst>
+                                            <p:cond delay="0"/>
+                                          </p:stCondLst>
+                                        </p:cTn>
+                                        <p:tgtEl>
+                                          <p:spTgt spid="3">
+                                            <p:txEl>
+                                              <p:pRg st="1" end="1"/>
+                                            </p:txEl>
+                                          </p:spTgt>
+                                        </p:tgtEl>
+                                        <p:attrNameLst>
+                                          <p:attrName>style.visibility</p:attrName>
+                                        </p:attrNameLst>
+                                      </p:cBhvr>
+                                      <p:to>
+                                        <p:strVal val="visible"/>
+                                      </p:to>
+                                    </p:set>
+                                    <p:anim calcmode="lin" valueType="num">
+                                      <p:cBhvr>
+                                        <p:cTn id="21" dur="1000" fill="hold"/>
+                                        <p:tgtEl>
+                                          <p:spTgt spid="3">
+                                            <p:txEl>
+                                              <p:pRg st="1" end="1"/>
+                                            </p:txEl>
+                                          </p:spTgt>
+                                        </p:tgtEl>
+                                        <p:attrNameLst>
+                                          <p:attrName>ppt_w</p:attrName>
+                                        </p:attrNameLst>
+                                      </p:cBhvr>
+                                      <p:tavLst>
+                                        <p:tav tm="0">
+                                          <p:val>
+                                            <p:fltVal val="0"/>
+                                          </p:val>
+                                        </p:tav>
+                                        <p:tav tm="100000">
+                                          <p:val>
+                                            <p:strVal val="#ppt_w"/>
+                                          </p:val>
+                                        </p:tav>
+                                      </p:tavLst>
+                                    </p:anim>
+                                    <p:anim calcmode="lin" valueType="num">
+                                      <p:cBhvr>
+                                        <p:cTn id="22" dur="1000" fill="hold"/>
+                                        <p:tgtEl>
+                                          <p:spTgt spid="3">
+                                            <p:txEl>
+                                              <p:pRg st="1" end="1"/>
+                                            </p:txEl>
+                                          </p:spTgt>
+                                        </p:tgtEl>
+                                        <p:attrNameLst>
+                                          <p:attrName>ppt_h</p:attrName>
+                                        </p:attrNameLst>
+                                      </p:cBhvr>
+                                      <p:tavLst>
+                                        <p:tav tm="0">
+                                          <p:val>
+                                            <p:fltVal val="0"/>
+                                          </p:val>
+                                        </p:tav>
+                                        <p:tav tm="100000">
+                                          <p:val>
+                                            <p:strVal val="#ppt_h"/>
+                                          </p:val>
+                                        </p:tav>
+                                      </p:tavLst>
+                                    </p:anim>
+                                    <p:anim calcmode="lin" valueType="num">
+                                      <p:cBhvr>
+                                        <p:cTn id="23" dur="1000" fill="hold"/>
+                                        <p:tgtEl>
+                                          <p:spTgt spid="3">
+                                            <p:txEl>
+                                              <p:pRg st="1" end="1"/>
+                                            </p:txEl>
+                                          </p:spTgt>
+                                        </p:tgtEl>
+                                        <p:attrNameLst>
+                                          <p:attrName>style.rotation</p:attrName>
+                                        </p:attrNameLst>
+                                      </p:cBhvr>
+                                      <p:tavLst>
+                                        <p:tav tm="0">
+                                          <p:val>
+                                            <p:fltVal val="90"/>
+                                          </p:val>
+                                        </p:tav>
+                                        <p:tav tm="100000">
+                                          <p:val>
+                                            <p:fltVal val="0"/>
+                                          </p:val>
+                                        </p:tav>
+                                      </p:tavLst>
+                                    </p:anim>
+                                    <p:animEffect transition="in" filter="fade">
+                                      <p:cBhvr>
+                                        <p:cTn id="24" dur="1000"/>
+                                        <p:tgtEl>
+                                          <p:spTgt spid="3">
+                                            <p:txEl>
+                                              <p:pRg st="1" end="1"/>
+                                            </p:txEl>
+                                          </p:spTgt>
+                                        </p:tgtEl>
+                                      </p:cBhvr>
+                                    </p:animEffect>
+                                  </p:childTnLst>
+                                </p:cTn>
+                              </p:par>
+                            </p:childTnLst>
+                          </p:cTn>
+                        </p:par>
+                        <p:par>
+                          <p:cTn id="25" fill="hold">
+                            <p:stCondLst>
+                              <p:cond delay="5000"/>
+                            </p:stCondLst>
+                            <p:childTnLst>
+                              <p:par>
+                                <p:cTn id="26" presetID="31" presetClass="entr" presetSubtype="0" fill="hold" grpId="0" nodeType="afterEffect">
+                                  <p:stCondLst>
+                                    <p:cond delay="1000"/>
+                                  </p:stCondLst>
+                                  <p:childTnLst>
+                                    <p:set>
+                                      <p:cBhvr>
+                                        <p:cTn id="27" dur="1" fill="hold">
+                                          <p:stCondLst>
+                                            <p:cond delay="0"/>
+                                          </p:stCondLst>
+                                        </p:cTn>
+                                        <p:tgtEl>
+                                          <p:spTgt spid="3">
+                                            <p:txEl>
+                                              <p:pRg st="2" end="2"/>
+                                            </p:txEl>
+                                          </p:spTgt>
+                                        </p:tgtEl>
+                                        <p:attrNameLst>
+                                          <p:attrName>style.visibility</p:attrName>
+                                        </p:attrNameLst>
+                                      </p:cBhvr>
+                                      <p:to>
+                                        <p:strVal val="visible"/>
+                                      </p:to>
+                                    </p:set>
+                                    <p:anim calcmode="lin" valueType="num">
+                                      <p:cBhvr>
+                                        <p:cTn id="28" dur="1000" fill="hold"/>
+                                        <p:tgtEl>
+                                          <p:spTgt spid="3">
+                                            <p:txEl>
+                                              <p:pRg st="2" end="2"/>
+                                            </p:txEl>
+                                          </p:spTgt>
+                                        </p:tgtEl>
+                                        <p:attrNameLst>
+                                          <p:attrName>ppt_w</p:attrName>
+                                        </p:attrNameLst>
+                                      </p:cBhvr>
+                                      <p:tavLst>
+                                        <p:tav tm="0">
+                                          <p:val>
+                                            <p:fltVal val="0"/>
+                                          </p:val>
+                                        </p:tav>
+                                        <p:tav tm="100000">
+                                          <p:val>
+                                            <p:strVal val="#ppt_w"/>
+                                          </p:val>
+                                        </p:tav>
+                                      </p:tavLst>
+                                    </p:anim>
+                                    <p:anim calcmode="lin" valueType="num">
+                                      <p:cBhvr>
+                                        <p:cTn id="29" dur="1000" fill="hold"/>
+                                        <p:tgtEl>
+                                          <p:spTgt spid="3">
+                                            <p:txEl>
+                                              <p:pRg st="2" end="2"/>
+                                            </p:txEl>
+                                          </p:spTgt>
+                                        </p:tgtEl>
+                                        <p:attrNameLst>
+                                          <p:attrName>ppt_h</p:attrName>
+                                        </p:attrNameLst>
+                                      </p:cBhvr>
+                                      <p:tavLst>
+                                        <p:tav tm="0">
+                                          <p:val>
+                                            <p:fltVal val="0"/>
+                                          </p:val>
+                                        </p:tav>
+                                        <p:tav tm="100000">
+                                          <p:val>
+                                            <p:strVal val="#ppt_h"/>
+                                          </p:val>
+                                        </p:tav>
+                                      </p:tavLst>
+                                    </p:anim>
+                                    <p:anim calcmode="lin" valueType="num">
+                                      <p:cBhvr>
+                                        <p:cTn id="30" dur="1000" fill="hold"/>
+                                        <p:tgtEl>
+                                          <p:spTgt spid="3">
+                                            <p:txEl>
+                                              <p:pRg st="2" end="2"/>
+                                            </p:txEl>
+                                          </p:spTgt>
+                                        </p:tgtEl>
+                                        <p:attrNameLst>
+                                          <p:attrName>style.rotation</p:attrName>
+                                        </p:attrNameLst>
+                                      </p:cBhvr>
+                                      <p:tavLst>
+                                        <p:tav tm="0">
+                                          <p:val>
+                                            <p:fltVal val="90"/>
+                                          </p:val>
+                                        </p:tav>
+                                        <p:tav tm="100000">
+                                          <p:val>
+                                            <p:fltVal val="0"/>
+                                          </p:val>
+                                        </p:tav>
+                                      </p:tavLst>
+                                    </p:anim>
+                                    <p:animEffect transition="in" filter="fade">
+                                      <p:cBhvr>
+                                        <p:cTn id="31" dur="1000"/>
+                                        <p:tgtEl>
+                                          <p:spTgt spid="3">
+                                            <p:txEl>
+                                              <p:pRg st="2" end="2"/>
+                                            </p:txEl>
+                                          </p:spTgt>
+                                        </p:tgtEl>
+                                      </p:cBhvr>
+                                    </p:animEffect>
+                                  </p:childTnLst>
+                                </p:cTn>
+                              </p:par>
+                            </p:childTnLst>
+                          </p:cTn>
+                        </p:par>
+                        <p:par>
+                          <p:cTn id="32" fill="hold">
+                            <p:stCondLst>
+                              <p:cond delay="7000"/>
+                            </p:stCondLst>
+                            <p:childTnLst>
+                              <p:par>
+                                <p:cTn id="33" presetID="31" presetClass="entr" presetSubtype="0" fill="hold" grpId="0" nodeType="afterEffect">
+                                  <p:stCondLst>
+                                    <p:cond delay="1000"/>
+                                  </p:stCondLst>
+                                  <p:childTnLst>
+                                    <p:set>
+                                      <p:cBhvr>
+                                        <p:cTn id="34" dur="1" fill="hold">
+                                          <p:stCondLst>
+                                            <p:cond delay="0"/>
+                                          </p:stCondLst>
+                                        </p:cTn>
+                                        <p:tgtEl>
+                                          <p:spTgt spid="3">
+                                            <p:txEl>
+                                              <p:pRg st="3" end="3"/>
+                                            </p:txEl>
+                                          </p:spTgt>
+                                        </p:tgtEl>
+                                        <p:attrNameLst>
+                                          <p:attrName>style.visibility</p:attrName>
+                                        </p:attrNameLst>
+                                      </p:cBhvr>
+                                      <p:to>
+                                        <p:strVal val="visible"/>
+                                      </p:to>
+                                    </p:set>
+                                    <p:anim calcmode="lin" valueType="num">
+                                      <p:cBhvr>
+                                        <p:cTn id="35" dur="1000" fill="hold"/>
+                                        <p:tgtEl>
+                                          <p:spTgt spid="3">
+                                            <p:txEl>
+                                              <p:pRg st="3" end="3"/>
+                                            </p:txEl>
+                                          </p:spTgt>
+                                        </p:tgtEl>
+                                        <p:attrNameLst>
+                                          <p:attrName>ppt_w</p:attrName>
+                                        </p:attrNameLst>
+                                      </p:cBhvr>
+                                      <p:tavLst>
+                                        <p:tav tm="0">
+                                          <p:val>
+                                            <p:fltVal val="0"/>
+                                          </p:val>
+                                        </p:tav>
+                                        <p:tav tm="100000">
+                                          <p:val>
+                                            <p:strVal val="#ppt_w"/>
+                                          </p:val>
+                                        </p:tav>
+                                      </p:tavLst>
+                                    </p:anim>
+                                    <p:anim calcmode="lin" valueType="num">
+                                      <p:cBhvr>
+                                        <p:cTn id="36" dur="1000" fill="hold"/>
+                                        <p:tgtEl>
+                                          <p:spTgt spid="3">
+                                            <p:txEl>
+                                              <p:pRg st="3" end="3"/>
+                                            </p:txEl>
+                                          </p:spTgt>
+                                        </p:tgtEl>
+                                        <p:attrNameLst>
+                                          <p:attrName>ppt_h</p:attrName>
+                                        </p:attrNameLst>
+                                      </p:cBhvr>
+                                      <p:tavLst>
+                                        <p:tav tm="0">
+                                          <p:val>
+                                            <p:fltVal val="0"/>
+                                          </p:val>
+                                        </p:tav>
+                                        <p:tav tm="100000">
+                                          <p:val>
+                                            <p:strVal val="#ppt_h"/>
+                                          </p:val>
+                                        </p:tav>
+                                      </p:tavLst>
+                                    </p:anim>
+                                    <p:anim calcmode="lin" valueType="num">
+                                      <p:cBhvr>
+                                        <p:cTn id="37" dur="1000" fill="hold"/>
+                                        <p:tgtEl>
+                                          <p:spTgt spid="3">
+                                            <p:txEl>
+                                              <p:pRg st="3" end="3"/>
+                                            </p:txEl>
+                                          </p:spTgt>
+                                        </p:tgtEl>
+                                        <p:attrNameLst>
+                                          <p:attrName>style.rotation</p:attrName>
+                                        </p:attrNameLst>
+                                      </p:cBhvr>
+                                      <p:tavLst>
+                                        <p:tav tm="0">
+                                          <p:val>
+                                            <p:fltVal val="90"/>
+                                          </p:val>
+                                        </p:tav>
+                                        <p:tav tm="100000">
+                                          <p:val>
+                                            <p:fltVal val="0"/>
+                                          </p:val>
+                                        </p:tav>
+                                      </p:tavLst>
+                                    </p:anim>
+                                    <p:animEffect transition="in" filter="fade">
+                                      <p:cBhvr>
+                                        <p:cTn id="38" dur="1000"/>
+                                        <p:tgtEl>
+                                          <p:spTgt spid="3">
+                                            <p:txEl>
+                                              <p:pRg st="3" end="3"/>
+                                            </p:txEl>
+                                          </p:spTgt>
+                                        </p:tgtEl>
+                                      </p:cBhvr>
+                                    </p:animEffect>
+                                  </p:childTnLst>
+                                </p:cTn>
+                              </p:par>
+                            </p:childTnLst>
+                          </p:cTn>
+                        </p:par>
+                      </p:childTnLst>
+                    </p:cTn>
+                  </p:par>
+                </p:childTnLst>
+              </p:cTn>
+              <p:prevCondLst>
+                <p:cond evt="onPrev" delay="0">
+                  <p:tgtEl>
+                    <p:sldTgt/>
+                  </p:tgtEl>
+                </p:cond>
+              </p:prevCondLst>
+              <p:nextCondLst>
+                <p:cond evt="onNext" delay="0">
+                  <p:tgtEl>
+                    <p:sldTgt/>
+                  </p:tgtEl>
+                </p:cond>
+              </p:nextCondLst>
+            </p:seq>
+          </p:childTnLst>
+        </p:cTn>
+      </p:par>
+    </p:tnLst>
+    <p:bldLst>
+      <p:bldP spid="2" grpId="0"/>
+      <p:bldP spid="3" grpId="0" uiExpand="1" build="p"/>
+    </p:bldLst>
+  </p:timing>
+</p:sld>
+</file>
+
+<file path=ppt/slides/slide28.xml><?xml version="1.0" encoding="utf-8"?>
+<p:sld xmlns:a="http://schemas.openxmlformats.org/drawingml/2006/main" xmlns:r="http://schemas.openxmlformats.org/officeDocument/2006/relationships" xmlns:p="http://schemas.openxmlformats.org/presentationml/2006/main">
+  <p:cSld>
+    <p:spTree>
+      <p:nvGrpSpPr>
+        <p:cNvPr id="1" name=""/>
+        <p:cNvGrpSpPr/>
+        <p:nvPr/>
+      </p:nvGrpSpPr>
+      <p:grpSpPr>
+        <a:xfrm>
+          <a:off x="0" y="0"/>
+          <a:ext cx="0" cy="0"/>
+          <a:chOff x="0" y="0"/>
+          <a:chExt cx="0" cy="0"/>
+        </a:xfrm>
+      </p:grpSpPr>
+      <p:sp>
+        <p:nvSpPr>
+          <p:cNvPr id="2" name="Titel 1">
+            <a:extLst>
+              <a:ext uri="{FF2B5EF4-FFF2-40B4-BE49-F238E27FC236}">
+                <a16:creationId xmlns:a16="http://schemas.microsoft.com/office/drawing/2014/main" id="{FBBF6712-CF2F-CCFB-88C9-B2834CF01477}"/>
+              </a:ext>
+            </a:extLst>
+          </p:cNvPr>
+          <p:cNvSpPr>
+            <a:spLocks noGrp="1"/>
+          </p:cNvSpPr>
+          <p:nvPr>
+            <p:ph type="title"/>
+          </p:nvPr>
+        </p:nvSpPr>
+        <p:spPr/>
+        <p:txBody>
+          <a:bodyPr/>
+          <a:lstStyle/>
+          <a:p>
+            <a:r>
+              <a:rPr lang="de-DE" sz="4400" dirty="0">
+                <a:solidFill>
+                  <a:srgbClr val="000000"/>
+                </a:solidFill>
+                <a:latin typeface="AppleSystemUIFont"/>
+              </a:rPr>
+              <a:t>Top-N-Zeilen</a:t>
+            </a:r>
+            <a:endParaRPr lang="en-US" dirty="0"/>
+          </a:p>
+        </p:txBody>
+      </p:sp>
+      <p:sp>
+        <p:nvSpPr>
+          <p:cNvPr id="5" name="Rectangle 2">
+            <a:extLst>
+              <a:ext uri="{FF2B5EF4-FFF2-40B4-BE49-F238E27FC236}">
+                <a16:creationId xmlns:a16="http://schemas.microsoft.com/office/drawing/2014/main" id="{28A07D40-036E-CD78-7364-421C1115DDD1}"/>
+              </a:ext>
+            </a:extLst>
+          </p:cNvPr>
+          <p:cNvSpPr>
+            <a:spLocks noGrp="1" noChangeArrowheads="1"/>
+          </p:cNvSpPr>
+          <p:nvPr>
+            <p:ph idx="1"/>
+          </p:nvPr>
+        </p:nvSpPr>
+        <p:spPr bwMode="auto">
+          <a:xfrm>
+            <a:off x="838200" y="1713082"/>
+            <a:ext cx="11353800" cy="2319609"/>
+          </a:xfrm>
+          <a:prstGeom prst="rect">
+            <a:avLst/>
+          </a:prstGeom>
+          <a:noFill/>
+          <a:ln>
+            <a:noFill/>
+          </a:ln>
+          <a:effectLst/>
+          <a:extLst>
+            <a:ext uri="{909E8E84-426E-40DD-AFC4-6F175D3DCCD1}">
+              <a14:hiddenFill xmlns:a14="http://schemas.microsoft.com/office/drawing/2010/main">
+                <a:solidFill>
+                  <a:schemeClr val="accent1"/>
+                </a:solidFill>
+              </a14:hiddenFill>
+            </a:ext>
+            <a:ext uri="{91240B29-F687-4F45-9708-019B960494DF}">
+              <a14:hiddenLine xmlns:a14="http://schemas.microsoft.com/office/drawing/2010/main" w="9525">
+                <a:solidFill>
+                  <a:schemeClr val="tx1"/>
+                </a:solidFill>
+                <a:miter lim="800000"/>
+                <a:headEnd/>
+                <a:tailEnd/>
+              </a14:hiddenLine>
+            </a:ext>
+            <a:ext uri="{AF507438-7753-43E0-B8FC-AC1667EBCBE1}">
+              <a14:hiddenEffects xmlns:a14="http://schemas.microsoft.com/office/drawing/2010/main">
+                <a:effectLst>
+                  <a:outerShdw dist="35921" dir="2700000" algn="ctr" rotWithShape="0">
+                    <a:schemeClr val="bg2"/>
+                  </a:outerShdw>
+                </a:effectLst>
+              </a14:hiddenEffects>
+            </a:ext>
+          </a:extLst>
+        </p:spPr>
+        <p:txBody>
+          <a:bodyPr vert="horz" wrap="square" lIns="91440" tIns="45720" rIns="91440" bIns="45720" numCol="1" anchor="ctr" anchorCtr="0" compatLnSpc="1">
+            <a:prstTxWarp prst="textNoShape">
+              <a:avLst/>
+            </a:prstTxWarp>
+            <a:spAutoFit/>
+          </a:bodyPr>
+          <a:lstStyle/>
+          <a:p>
+            <a:r>
+              <a:rPr lang="de-AT" dirty="0"/>
+              <a:t>Beschränkung auf bestimmte Zeilenzahl</a:t>
+            </a:r>
+          </a:p>
+          <a:p>
+            <a:endParaRPr lang="en-US" dirty="0"/>
+          </a:p>
+          <a:p>
+            <a:pPr marL="0" marR="0" lvl="0" indent="0" algn="l" defTabSz="914400" rtl="0" eaLnBrk="0" fontAlgn="base" latinLnBrk="0" hangingPunct="0">
+              <a:lnSpc>
+                <a:spcPct val="100000"/>
+              </a:lnSpc>
+              <a:spcBef>
+                <a:spcPct val="0"/>
+              </a:spcBef>
+              <a:spcAft>
+                <a:spcPct val="0"/>
+              </a:spcAft>
+              <a:buClrTx/>
+              <a:buSzTx/>
+              <a:buFontTx/>
+              <a:buNone/>
+              <a:tabLst/>
+            </a:pPr>
+            <a:endParaRPr lang="en-US" sz="1800" dirty="0">
+              <a:solidFill>
+                <a:prstClr val="black"/>
+              </a:solidFill>
+              <a:latin typeface="AppleSystemUIFont"/>
+            </a:endParaRPr>
+          </a:p>
+          <a:p>
+            <a:pPr marL="0" marR="0" lvl="0" indent="0" algn="l" defTabSz="914400" rtl="0" eaLnBrk="0" fontAlgn="base" latinLnBrk="0" hangingPunct="0">
+              <a:lnSpc>
+                <a:spcPct val="100000"/>
+              </a:lnSpc>
+              <a:spcBef>
+                <a:spcPct val="0"/>
+              </a:spcBef>
+              <a:spcAft>
+                <a:spcPct val="0"/>
+              </a:spcAft>
+              <a:buClrTx/>
+              <a:buSzTx/>
+              <a:buFontTx/>
+              <a:buNone/>
+              <a:tabLst/>
+            </a:pPr>
+            <a:endParaRPr kumimoji="0" lang="en-US" altLang="en-US" sz="1800" b="0" i="0" u="none" strike="noStrike" cap="none" normalizeH="0" baseline="0" dirty="0">
+              <a:ln>
+                <a:noFill/>
+              </a:ln>
+              <a:solidFill>
+                <a:prstClr val="black"/>
+              </a:solidFill>
+              <a:effectLst/>
+              <a:latin typeface="AppleSystemUIFont"/>
+            </a:endParaRPr>
+          </a:p>
+          <a:p>
+            <a:pPr marL="0" marR="0" lvl="0" indent="0" algn="l" defTabSz="914400" rtl="0" eaLnBrk="0" fontAlgn="base" latinLnBrk="0" hangingPunct="0">
+              <a:lnSpc>
+                <a:spcPct val="100000"/>
+              </a:lnSpc>
+              <a:spcBef>
+                <a:spcPct val="0"/>
+              </a:spcBef>
+              <a:spcAft>
+                <a:spcPct val="0"/>
+              </a:spcAft>
+              <a:buClrTx/>
+              <a:buSzTx/>
+              <a:buFontTx/>
+              <a:buNone/>
+              <a:tabLst/>
+            </a:pPr>
+            <a:endParaRPr kumimoji="0" lang="en-US" altLang="en-US" sz="1000" b="0" i="0" u="none" strike="noStrike" cap="none" normalizeH="0" baseline="0" dirty="0">
+              <a:ln>
+                <a:noFill/>
+              </a:ln>
+              <a:solidFill>
+                <a:schemeClr val="tx1"/>
+              </a:solidFill>
+              <a:effectLst/>
+              <a:latin typeface="FontinSans"/>
+            </a:endParaRPr>
+          </a:p>
+          <a:p>
+            <a:pPr marL="0" marR="0" lvl="0" indent="0" algn="l" defTabSz="914400" rtl="0" eaLnBrk="0" fontAlgn="base" latinLnBrk="0" hangingPunct="0">
+              <a:lnSpc>
+                <a:spcPct val="100000"/>
+              </a:lnSpc>
+              <a:spcBef>
+                <a:spcPct val="0"/>
+              </a:spcBef>
+              <a:spcAft>
+                <a:spcPct val="0"/>
+              </a:spcAft>
+              <a:buClrTx/>
+              <a:buSzTx/>
+              <a:buFontTx/>
+              <a:buNone/>
+              <a:tabLst/>
+            </a:pPr>
+            <a:endParaRPr lang="en-US" altLang="en-US" sz="1000" i="1" dirty="0">
+              <a:latin typeface="FontinSans"/>
+            </a:endParaRPr>
+          </a:p>
+          <a:p>
+            <a:pPr marL="0" marR="0" lvl="0" indent="0" algn="l" defTabSz="914400" rtl="0" eaLnBrk="0" fontAlgn="base" latinLnBrk="0" hangingPunct="0">
+              <a:lnSpc>
+                <a:spcPct val="100000"/>
+              </a:lnSpc>
+              <a:spcBef>
+                <a:spcPct val="0"/>
+              </a:spcBef>
+              <a:spcAft>
+                <a:spcPct val="0"/>
+              </a:spcAft>
+              <a:buClrTx/>
+              <a:buSzTx/>
+              <a:buFontTx/>
+              <a:buNone/>
+              <a:tabLst/>
+            </a:pPr>
+            <a:endParaRPr lang="en-US" altLang="en-US" sz="1000" dirty="0">
+              <a:latin typeface="FontinSans"/>
+            </a:endParaRPr>
+          </a:p>
+          <a:p>
+            <a:pPr marL="0" marR="0" lvl="0" indent="0" algn="l" defTabSz="914400" rtl="0" eaLnBrk="0" fontAlgn="base" latinLnBrk="0" hangingPunct="0">
+              <a:lnSpc>
+                <a:spcPct val="100000"/>
+              </a:lnSpc>
+              <a:spcBef>
+                <a:spcPct val="0"/>
+              </a:spcBef>
+              <a:spcAft>
+                <a:spcPct val="0"/>
+              </a:spcAft>
+              <a:buClrTx/>
+              <a:buSzTx/>
+              <a:buFontTx/>
+              <a:buNone/>
+              <a:tabLst/>
+            </a:pPr>
+            <a:endParaRPr lang="en-US" altLang="en-US" sz="1000" dirty="0">
+              <a:latin typeface="FontinSans"/>
+            </a:endParaRPr>
+          </a:p>
+          <a:p>
+            <a:pPr marL="0" marR="0" lvl="0" indent="0" algn="l" defTabSz="914400" rtl="0" eaLnBrk="0" fontAlgn="base" latinLnBrk="0" hangingPunct="0">
+              <a:lnSpc>
+                <a:spcPct val="100000"/>
+              </a:lnSpc>
+              <a:spcBef>
+                <a:spcPct val="0"/>
+              </a:spcBef>
+              <a:spcAft>
+                <a:spcPct val="0"/>
+              </a:spcAft>
+              <a:buClrTx/>
+              <a:buSzTx/>
+              <a:buFontTx/>
+              <a:buNone/>
+              <a:tabLst/>
+            </a:pPr>
+            <a:endParaRPr lang="en-US" altLang="en-US" sz="1000" dirty="0">
+              <a:latin typeface="FontinSans"/>
+            </a:endParaRPr>
+          </a:p>
+        </p:txBody>
+      </p:sp>
+      <p:pic>
+        <p:nvPicPr>
+          <p:cNvPr id="4" name="Grafik 3">
+            <a:extLst>
+              <a:ext uri="{FF2B5EF4-FFF2-40B4-BE49-F238E27FC236}">
+                <a16:creationId xmlns:a16="http://schemas.microsoft.com/office/drawing/2014/main" id="{20F281A8-ED04-C289-6713-E88AEB83C524}"/>
+              </a:ext>
+            </a:extLst>
+          </p:cNvPr>
+          <p:cNvPicPr>
+            <a:picLocks noChangeAspect="1"/>
+          </p:cNvPicPr>
+          <p:nvPr/>
+        </p:nvPicPr>
+        <p:blipFill>
+          <a:blip r:embed="rId3"/>
+          <a:stretch>
+            <a:fillRect/>
+          </a:stretch>
+        </p:blipFill>
+        <p:spPr>
+          <a:xfrm>
+            <a:off x="851452" y="2325518"/>
+            <a:ext cx="7610475" cy="2819400"/>
+          </a:xfrm>
+          <a:prstGeom prst="rect">
+            <a:avLst/>
+          </a:prstGeom>
+        </p:spPr>
+      </p:pic>
+    </p:spTree>
+    <p:extLst>
+      <p:ext uri="{BB962C8B-B14F-4D97-AF65-F5344CB8AC3E}">
+        <p14:creationId xmlns:p14="http://schemas.microsoft.com/office/powerpoint/2010/main" val="3771304333"/>
+      </p:ext>
+    </p:extLst>
+  </p:cSld>
+  <p:clrMapOvr>
+    <a:masterClrMapping/>
+  </p:clrMapOvr>
+  <mc:AlternateContent xmlns:mc="http://schemas.openxmlformats.org/markup-compatibility/2006" xmlns:p14="http://schemas.microsoft.com/office/powerpoint/2010/main">
+    <mc:Choice Requires="p14">
+      <p:transition spd="slow" p14:dur="1500">
+        <p:split orient="vert"/>
+      </p:transition>
+    </mc:Choice>
+    <mc:Fallback xmlns="">
+      <p:transition spd="slow">
+        <p:split orient="vert"/>
+      </p:transition>
+    </mc:Fallback>
+  </mc:AlternateContent>
+  <p:timing>
+    <p:tnLst>
+      <p:par>
+        <p:cTn id="1" dur="indefinite" restart="never" nodeType="tmRoot">
+          <p:childTnLst>
+            <p:seq concurrent="1" nextAc="seek">
+              <p:cTn id="2" dur="indefinite" nodeType="mainSeq">
+                <p:childTnLst>
+                  <p:par>
+                    <p:cTn id="3" fill="hold">
+                      <p:stCondLst>
+                        <p:cond delay="indefinite"/>
+                        <p:cond evt="onBegin" delay="0">
+                          <p:tn val="2"/>
+                        </p:cond>
+                      </p:stCondLst>
+                      <p:childTnLst>
+                        <p:par>
+                          <p:cTn id="4" fill="hold">
+                            <p:stCondLst>
+                              <p:cond delay="0"/>
+                            </p:stCondLst>
+                            <p:childTnLst>
+                              <p:par>
+                                <p:cTn id="5" presetID="1" presetClass="entr" presetSubtype="0" fill="hold" grpId="0" nodeType="afterEffect">
+                                  <p:stCondLst>
+                                    <p:cond delay="0"/>
+                                  </p:stCondLst>
+                                  <p:childTnLst>
+                                    <p:set>
+                                      <p:cBhvr>
+                                        <p:cTn id="6" dur="1" fill="hold">
+                                          <p:stCondLst>
+                                            <p:cond delay="0"/>
+                                          </p:stCondLst>
+                                        </p:cTn>
+                                        <p:tgtEl>
+                                          <p:spTgt spid="2"/>
+                                        </p:tgtEl>
+                                        <p:attrNameLst>
+                                          <p:attrName>style.visibility</p:attrName>
+                                        </p:attrNameLst>
+                                      </p:cBhvr>
+                                      <p:to>
+                                        <p:strVal val="visible"/>
+                                      </p:to>
+                                    </p:set>
+                                  </p:childTnLst>
+                                </p:cTn>
+                              </p:par>
+                            </p:childTnLst>
+                          </p:cTn>
+                        </p:par>
+                        <p:par>
+                          <p:cTn id="7" fill="hold">
+                            <p:stCondLst>
+                              <p:cond delay="0"/>
+                            </p:stCondLst>
+                            <p:childTnLst>
+                              <p:par>
+                                <p:cTn id="8" presetID="1" presetClass="entr" presetSubtype="0" fill="hold" grpId="0" nodeType="afterEffect">
+                                  <p:stCondLst>
+                                    <p:cond delay="1000"/>
+                                  </p:stCondLst>
+                                  <p:childTnLst>
+                                    <p:set>
+                                      <p:cBhvr>
+                                        <p:cTn id="9" dur="1" fill="hold">
+                                          <p:stCondLst>
+                                            <p:cond delay="0"/>
+                                          </p:stCondLst>
+                                        </p:cTn>
+                                        <p:tgtEl>
+                                          <p:spTgt spid="5">
+                                            <p:txEl>
+                                              <p:pRg st="0" end="0"/>
+                                            </p:txEl>
+                                          </p:spTgt>
+                                        </p:tgtEl>
+                                        <p:attrNameLst>
+                                          <p:attrName>style.visibility</p:attrName>
+                                        </p:attrNameLst>
+                                      </p:cBhvr>
+                                      <p:to>
+                                        <p:strVal val="visible"/>
+                                      </p:to>
+                                    </p:set>
+                                  </p:childTnLst>
+                                </p:cTn>
+                              </p:par>
+                            </p:childTnLst>
+                          </p:cTn>
+                        </p:par>
+                        <p:par>
+                          <p:cTn id="10" fill="hold">
+                            <p:stCondLst>
+                              <p:cond delay="1000"/>
+                            </p:stCondLst>
+                            <p:childTnLst>
+                              <p:par>
+                                <p:cTn id="11" presetID="2" presetClass="entr" presetSubtype="4" fill="hold" nodeType="afterEffect">
+                                  <p:stCondLst>
+                                    <p:cond delay="2000"/>
+                                  </p:stCondLst>
+                                  <p:childTnLst>
+                                    <p:set>
+                                      <p:cBhvr>
+                                        <p:cTn id="12" dur="1" fill="hold">
+                                          <p:stCondLst>
+                                            <p:cond delay="0"/>
+                                          </p:stCondLst>
+                                        </p:cTn>
+                                        <p:tgtEl>
+                                          <p:spTgt spid="4"/>
+                                        </p:tgtEl>
+                                        <p:attrNameLst>
+                                          <p:attrName>style.visibility</p:attrName>
+                                        </p:attrNameLst>
+                                      </p:cBhvr>
+                                      <p:to>
+                                        <p:strVal val="visible"/>
+                                      </p:to>
+                                    </p:set>
+                                    <p:anim calcmode="lin" valueType="num">
+                                      <p:cBhvr additive="base">
+                                        <p:cTn id="13" dur="500" fill="hold"/>
+                                        <p:tgtEl>
+                                          <p:spTgt spid="4"/>
+                                        </p:tgtEl>
+                                        <p:attrNameLst>
+                                          <p:attrName>ppt_x</p:attrName>
+                                        </p:attrNameLst>
+                                      </p:cBhvr>
+                                      <p:tavLst>
+                                        <p:tav tm="0">
+                                          <p:val>
+                                            <p:strVal val="#ppt_x"/>
+                                          </p:val>
+                                        </p:tav>
+                                        <p:tav tm="100000">
+                                          <p:val>
+                                            <p:strVal val="#ppt_x"/>
+                                          </p:val>
+                                        </p:tav>
+                                      </p:tavLst>
+                                    </p:anim>
+                                    <p:anim calcmode="lin" valueType="num">
+                                      <p:cBhvr additive="base">
+                                        <p:cTn id="14" dur="500" fill="hold"/>
+                                        <p:tgtEl>
+                                          <p:spTgt spid="4"/>
+                                        </p:tgtEl>
+                                        <p:attrNameLst>
+                                          <p:attrName>ppt_y</p:attrName>
+                                        </p:attrNameLst>
+                                      </p:cBhvr>
+                                      <p:tavLst>
+                                        <p:tav tm="0">
+                                          <p:val>
+                                            <p:strVal val="1+#ppt_h/2"/>
+                                          </p:val>
+                                        </p:tav>
+                                        <p:tav tm="100000">
+                                          <p:val>
+                                            <p:strVal val="#ppt_y"/>
+                                          </p:val>
+                                        </p:tav>
+                                      </p:tavLst>
+                                    </p:anim>
+                                  </p:childTnLst>
+                                </p:cTn>
+                              </p:par>
+                            </p:childTnLst>
+                          </p:cTn>
+                        </p:par>
+                      </p:childTnLst>
+                    </p:cTn>
+                  </p:par>
+                </p:childTnLst>
+              </p:cTn>
+              <p:prevCondLst>
+                <p:cond evt="onPrev" delay="0">
+                  <p:tgtEl>
+                    <p:sldTgt/>
+                  </p:tgtEl>
+                </p:cond>
+              </p:prevCondLst>
+              <p:nextCondLst>
+                <p:cond evt="onNext" delay="0">
+                  <p:tgtEl>
+                    <p:sldTgt/>
+                  </p:tgtEl>
+                </p:cond>
+              </p:nextCondLst>
+            </p:seq>
+          </p:childTnLst>
+        </p:cTn>
+      </p:par>
+    </p:tnLst>
+    <p:bldLst>
+      <p:bldP spid="2" grpId="0"/>
+      <p:bldP spid="5" grpId="0" uiExpand="1" build="p"/>
+    </p:bldLst>
+  </p:timing>
+</p:sld>
+</file>
+
+<file path=ppt/slides/slide29.xml><?xml version="1.0" encoding="utf-8"?>
+<p:sld xmlns:a="http://schemas.openxmlformats.org/drawingml/2006/main" xmlns:r="http://schemas.openxmlformats.org/officeDocument/2006/relationships" xmlns:p="http://schemas.openxmlformats.org/presentationml/2006/main">
+  <p:cSld>
+    <p:spTree>
+      <p:nvGrpSpPr>
+        <p:cNvPr id="1" name=""/>
+        <p:cNvGrpSpPr/>
+        <p:nvPr/>
+      </p:nvGrpSpPr>
+      <p:grpSpPr>
+        <a:xfrm>
+          <a:off x="0" y="0"/>
+          <a:ext cx="0" cy="0"/>
+          <a:chOff x="0" y="0"/>
+          <a:chExt cx="0" cy="0"/>
+        </a:xfrm>
+      </p:grpSpPr>
+      <p:sp>
+        <p:nvSpPr>
+          <p:cNvPr id="2" name="Titel 1">
+            <a:extLst>
+              <a:ext uri="{FF2B5EF4-FFF2-40B4-BE49-F238E27FC236}">
+                <a16:creationId xmlns:a16="http://schemas.microsoft.com/office/drawing/2014/main" id="{FBBF6712-CF2F-CCFB-88C9-B2834CF01477}"/>
+              </a:ext>
+            </a:extLst>
+          </p:cNvPr>
+          <p:cNvSpPr>
+            <a:spLocks noGrp="1"/>
+          </p:cNvSpPr>
+          <p:nvPr>
+            <p:ph type="title"/>
+          </p:nvPr>
+        </p:nvSpPr>
+        <p:spPr/>
+        <p:txBody>
+          <a:bodyPr/>
+          <a:lstStyle/>
+          <a:p>
+            <a:r>
+              <a:rPr lang="de-DE" sz="4400" dirty="0">
+                <a:solidFill>
+                  <a:srgbClr val="000000"/>
+                </a:solidFill>
+                <a:latin typeface="AppleSystemUIFont"/>
+              </a:rPr>
+              <a:t>Top-N-Zeilen</a:t>
+            </a:r>
+            <a:endParaRPr lang="en-US" dirty="0"/>
+          </a:p>
+        </p:txBody>
+      </p:sp>
+      <p:sp>
+        <p:nvSpPr>
+          <p:cNvPr id="5" name="Rectangle 2">
+            <a:extLst>
+              <a:ext uri="{FF2B5EF4-FFF2-40B4-BE49-F238E27FC236}">
+                <a16:creationId xmlns:a16="http://schemas.microsoft.com/office/drawing/2014/main" id="{28A07D40-036E-CD78-7364-421C1115DDD1}"/>
+              </a:ext>
+            </a:extLst>
+          </p:cNvPr>
+          <p:cNvSpPr>
+            <a:spLocks noGrp="1" noChangeArrowheads="1"/>
+          </p:cNvSpPr>
+          <p:nvPr>
+            <p:ph idx="1"/>
+          </p:nvPr>
+        </p:nvSpPr>
+        <p:spPr bwMode="auto">
+          <a:xfrm>
+            <a:off x="838200" y="1713082"/>
+            <a:ext cx="11353800" cy="2319609"/>
+          </a:xfrm>
+          <a:prstGeom prst="rect">
+            <a:avLst/>
+          </a:prstGeom>
+          <a:noFill/>
+          <a:ln>
+            <a:noFill/>
+          </a:ln>
+          <a:effectLst/>
+          <a:extLst>
+            <a:ext uri="{909E8E84-426E-40DD-AFC4-6F175D3DCCD1}">
+              <a14:hiddenFill xmlns:a14="http://schemas.microsoft.com/office/drawing/2010/main">
+                <a:solidFill>
+                  <a:schemeClr val="accent1"/>
+                </a:solidFill>
+              </a14:hiddenFill>
+            </a:ext>
+            <a:ext uri="{91240B29-F687-4F45-9708-019B960494DF}">
+              <a14:hiddenLine xmlns:a14="http://schemas.microsoft.com/office/drawing/2010/main" w="9525">
+                <a:solidFill>
+                  <a:schemeClr val="tx1"/>
+                </a:solidFill>
+                <a:miter lim="800000"/>
+                <a:headEnd/>
+                <a:tailEnd/>
+              </a14:hiddenLine>
+            </a:ext>
+            <a:ext uri="{AF507438-7753-43E0-B8FC-AC1667EBCBE1}">
+              <a14:hiddenEffects xmlns:a14="http://schemas.microsoft.com/office/drawing/2010/main">
+                <a:effectLst>
+                  <a:outerShdw dist="35921" dir="2700000" algn="ctr" rotWithShape="0">
+                    <a:schemeClr val="bg2"/>
+                  </a:outerShdw>
+                </a:effectLst>
+              </a14:hiddenEffects>
+            </a:ext>
+          </a:extLst>
+        </p:spPr>
+        <p:txBody>
+          <a:bodyPr vert="horz" wrap="square" lIns="91440" tIns="45720" rIns="91440" bIns="45720" numCol="1" anchor="ctr" anchorCtr="0" compatLnSpc="1">
+            <a:prstTxWarp prst="textNoShape">
+              <a:avLst/>
+            </a:prstTxWarp>
+            <a:spAutoFit/>
+          </a:bodyPr>
+          <a:lstStyle/>
+          <a:p>
+            <a:r>
+              <a:rPr lang="de-AT" dirty="0"/>
+              <a:t>Die Tabelle muss nicht vollständig gelesen werden</a:t>
+            </a:r>
+          </a:p>
+          <a:p>
+            <a:endParaRPr lang="en-US" dirty="0"/>
+          </a:p>
+          <a:p>
+            <a:pPr marL="0" marR="0" lvl="0" indent="0" algn="l" defTabSz="914400" rtl="0" eaLnBrk="0" fontAlgn="base" latinLnBrk="0" hangingPunct="0">
+              <a:lnSpc>
+                <a:spcPct val="100000"/>
+              </a:lnSpc>
+              <a:spcBef>
+                <a:spcPct val="0"/>
+              </a:spcBef>
+              <a:spcAft>
+                <a:spcPct val="0"/>
+              </a:spcAft>
+              <a:buClrTx/>
+              <a:buSzTx/>
+              <a:buFontTx/>
+              <a:buNone/>
+              <a:tabLst/>
+            </a:pPr>
+            <a:endParaRPr lang="en-US" sz="1800" dirty="0">
+              <a:solidFill>
+                <a:prstClr val="black"/>
+              </a:solidFill>
+              <a:latin typeface="AppleSystemUIFont"/>
+            </a:endParaRPr>
+          </a:p>
+          <a:p>
+            <a:pPr marL="0" marR="0" lvl="0" indent="0" algn="l" defTabSz="914400" rtl="0" eaLnBrk="0" fontAlgn="base" latinLnBrk="0" hangingPunct="0">
+              <a:lnSpc>
+                <a:spcPct val="100000"/>
+              </a:lnSpc>
+              <a:spcBef>
+                <a:spcPct val="0"/>
+              </a:spcBef>
+              <a:spcAft>
+                <a:spcPct val="0"/>
+              </a:spcAft>
+              <a:buClrTx/>
+              <a:buSzTx/>
+              <a:buFontTx/>
+              <a:buNone/>
+              <a:tabLst/>
+            </a:pPr>
+            <a:endParaRPr kumimoji="0" lang="en-US" altLang="en-US" sz="1800" b="0" i="0" u="none" strike="noStrike" cap="none" normalizeH="0" baseline="0" dirty="0">
+              <a:ln>
+                <a:noFill/>
+              </a:ln>
+              <a:solidFill>
+                <a:prstClr val="black"/>
+              </a:solidFill>
+              <a:effectLst/>
+              <a:latin typeface="AppleSystemUIFont"/>
+            </a:endParaRPr>
+          </a:p>
+          <a:p>
+            <a:pPr marL="0" marR="0" lvl="0" indent="0" algn="l" defTabSz="914400" rtl="0" eaLnBrk="0" fontAlgn="base" latinLnBrk="0" hangingPunct="0">
+              <a:lnSpc>
+                <a:spcPct val="100000"/>
+              </a:lnSpc>
+              <a:spcBef>
+                <a:spcPct val="0"/>
+              </a:spcBef>
+              <a:spcAft>
+                <a:spcPct val="0"/>
+              </a:spcAft>
+              <a:buClrTx/>
+              <a:buSzTx/>
+              <a:buFontTx/>
+              <a:buNone/>
+              <a:tabLst/>
+            </a:pPr>
+            <a:endParaRPr kumimoji="0" lang="en-US" altLang="en-US" sz="1000" b="0" i="0" u="none" strike="noStrike" cap="none" normalizeH="0" baseline="0" dirty="0">
+              <a:ln>
+                <a:noFill/>
+              </a:ln>
+              <a:solidFill>
+                <a:schemeClr val="tx1"/>
+              </a:solidFill>
+              <a:effectLst/>
+              <a:latin typeface="FontinSans"/>
+            </a:endParaRPr>
+          </a:p>
+          <a:p>
+            <a:pPr marL="0" marR="0" lvl="0" indent="0" algn="l" defTabSz="914400" rtl="0" eaLnBrk="0" fontAlgn="base" latinLnBrk="0" hangingPunct="0">
+              <a:lnSpc>
+                <a:spcPct val="100000"/>
+              </a:lnSpc>
+              <a:spcBef>
+                <a:spcPct val="0"/>
+              </a:spcBef>
+              <a:spcAft>
+                <a:spcPct val="0"/>
+              </a:spcAft>
+              <a:buClrTx/>
+              <a:buSzTx/>
+              <a:buFontTx/>
+              <a:buNone/>
+              <a:tabLst/>
+            </a:pPr>
+            <a:endParaRPr lang="en-US" altLang="en-US" sz="1000" i="1" dirty="0">
+              <a:latin typeface="FontinSans"/>
+            </a:endParaRPr>
+          </a:p>
+          <a:p>
+            <a:pPr marL="0" marR="0" lvl="0" indent="0" algn="l" defTabSz="914400" rtl="0" eaLnBrk="0" fontAlgn="base" latinLnBrk="0" hangingPunct="0">
+              <a:lnSpc>
+                <a:spcPct val="100000"/>
+              </a:lnSpc>
+              <a:spcBef>
+                <a:spcPct val="0"/>
+              </a:spcBef>
+              <a:spcAft>
+                <a:spcPct val="0"/>
+              </a:spcAft>
+              <a:buClrTx/>
+              <a:buSzTx/>
+              <a:buFontTx/>
+              <a:buNone/>
+              <a:tabLst/>
+            </a:pPr>
+            <a:endParaRPr lang="en-US" altLang="en-US" sz="1000" dirty="0">
+              <a:latin typeface="FontinSans"/>
+            </a:endParaRPr>
+          </a:p>
+          <a:p>
+            <a:pPr marL="0" marR="0" lvl="0" indent="0" algn="l" defTabSz="914400" rtl="0" eaLnBrk="0" fontAlgn="base" latinLnBrk="0" hangingPunct="0">
+              <a:lnSpc>
+                <a:spcPct val="100000"/>
+              </a:lnSpc>
+              <a:spcBef>
+                <a:spcPct val="0"/>
+              </a:spcBef>
+              <a:spcAft>
+                <a:spcPct val="0"/>
+              </a:spcAft>
+              <a:buClrTx/>
+              <a:buSzTx/>
+              <a:buFontTx/>
+              <a:buNone/>
+              <a:tabLst/>
+            </a:pPr>
+            <a:endParaRPr lang="en-US" altLang="en-US" sz="1000" dirty="0">
+              <a:latin typeface="FontinSans"/>
+            </a:endParaRPr>
+          </a:p>
+          <a:p>
+            <a:pPr marL="0" marR="0" lvl="0" indent="0" algn="l" defTabSz="914400" rtl="0" eaLnBrk="0" fontAlgn="base" latinLnBrk="0" hangingPunct="0">
+              <a:lnSpc>
+                <a:spcPct val="100000"/>
+              </a:lnSpc>
+              <a:spcBef>
+                <a:spcPct val="0"/>
+              </a:spcBef>
+              <a:spcAft>
+                <a:spcPct val="0"/>
+              </a:spcAft>
+              <a:buClrTx/>
+              <a:buSzTx/>
+              <a:buFontTx/>
+              <a:buNone/>
+              <a:tabLst/>
+            </a:pPr>
+            <a:endParaRPr lang="en-US" altLang="en-US" sz="1000" dirty="0">
+              <a:latin typeface="FontinSans"/>
+            </a:endParaRPr>
+          </a:p>
+        </p:txBody>
+      </p:sp>
+      <p:pic>
+        <p:nvPicPr>
+          <p:cNvPr id="6" name="Grafik 5">
+            <a:extLst>
+              <a:ext uri="{FF2B5EF4-FFF2-40B4-BE49-F238E27FC236}">
+                <a16:creationId xmlns:a16="http://schemas.microsoft.com/office/drawing/2014/main" id="{50057710-3CD5-DC6D-AB9B-E50C54D5D5EE}"/>
+              </a:ext>
+            </a:extLst>
+          </p:cNvPr>
+          <p:cNvPicPr>
+            <a:picLocks noChangeAspect="1"/>
+          </p:cNvPicPr>
+          <p:nvPr/>
+        </p:nvPicPr>
+        <p:blipFill>
+          <a:blip r:embed="rId3"/>
+          <a:stretch>
+            <a:fillRect/>
+          </a:stretch>
+        </p:blipFill>
+        <p:spPr>
+          <a:xfrm>
+            <a:off x="838200" y="2294693"/>
+            <a:ext cx="11173510" cy="4198182"/>
+          </a:xfrm>
+          <a:prstGeom prst="rect">
+            <a:avLst/>
+          </a:prstGeom>
+        </p:spPr>
+      </p:pic>
+    </p:spTree>
+    <p:extLst>
+      <p:ext uri="{BB962C8B-B14F-4D97-AF65-F5344CB8AC3E}">
+        <p14:creationId xmlns:p14="http://schemas.microsoft.com/office/powerpoint/2010/main" val="368826729"/>
+      </p:ext>
+    </p:extLst>
+  </p:cSld>
+  <p:clrMapOvr>
+    <a:masterClrMapping/>
+  </p:clrMapOvr>
+  <mc:AlternateContent xmlns:mc="http://schemas.openxmlformats.org/markup-compatibility/2006" xmlns:p14="http://schemas.microsoft.com/office/powerpoint/2010/main">
+    <mc:Choice Requires="p14">
+      <p:transition spd="slow" p14:dur="1500">
+        <p:split orient="vert"/>
+      </p:transition>
+    </mc:Choice>
+    <mc:Fallback xmlns="">
+      <p:transition spd="slow">
+        <p:split orient="vert"/>
+      </p:transition>
+    </mc:Fallback>
+  </mc:AlternateContent>
+  <p:timing>
+    <p:tnLst>
+      <p:par>
+        <p:cTn id="1" dur="indefinite" restart="never" nodeType="tmRoot">
+          <p:childTnLst>
+            <p:seq concurrent="1" nextAc="seek">
+              <p:cTn id="2" dur="indefinite" nodeType="mainSeq">
+                <p:childTnLst>
+                  <p:par>
+                    <p:cTn id="3" fill="hold">
+                      <p:stCondLst>
+                        <p:cond delay="indefinite"/>
+                        <p:cond evt="onBegin" delay="0">
+                          <p:tn val="2"/>
+                        </p:cond>
+                      </p:stCondLst>
+                      <p:childTnLst>
+                        <p:par>
+                          <p:cTn id="4" fill="hold">
+                            <p:stCondLst>
+                              <p:cond delay="0"/>
+                            </p:stCondLst>
+                            <p:childTnLst>
+                              <p:par>
+                                <p:cTn id="5" presetID="1" presetClass="entr" presetSubtype="0" fill="hold" grpId="0" nodeType="afterEffect">
+                                  <p:stCondLst>
+                                    <p:cond delay="0"/>
+                                  </p:stCondLst>
+                                  <p:childTnLst>
+                                    <p:set>
+                                      <p:cBhvr>
+                                        <p:cTn id="6" dur="1" fill="hold">
+                                          <p:stCondLst>
+                                            <p:cond delay="0"/>
+                                          </p:stCondLst>
+                                        </p:cTn>
+                                        <p:tgtEl>
+                                          <p:spTgt spid="2"/>
+                                        </p:tgtEl>
+                                        <p:attrNameLst>
+                                          <p:attrName>style.visibility</p:attrName>
+                                        </p:attrNameLst>
+                                      </p:cBhvr>
+                                      <p:to>
+                                        <p:strVal val="visible"/>
+                                      </p:to>
+                                    </p:set>
+                                  </p:childTnLst>
+                                </p:cTn>
+                              </p:par>
+                            </p:childTnLst>
+                          </p:cTn>
+                        </p:par>
+                        <p:par>
+                          <p:cTn id="7" fill="hold">
+                            <p:stCondLst>
+                              <p:cond delay="0"/>
+                            </p:stCondLst>
+                            <p:childTnLst>
+                              <p:par>
+                                <p:cTn id="8" presetID="1" presetClass="entr" presetSubtype="0" fill="hold" grpId="0" nodeType="afterEffect">
+                                  <p:stCondLst>
+                                    <p:cond delay="1000"/>
+                                  </p:stCondLst>
+                                  <p:childTnLst>
+                                    <p:set>
+                                      <p:cBhvr>
+                                        <p:cTn id="9" dur="1" fill="hold">
+                                          <p:stCondLst>
+                                            <p:cond delay="0"/>
+                                          </p:stCondLst>
+                                        </p:cTn>
+                                        <p:tgtEl>
+                                          <p:spTgt spid="5">
+                                            <p:txEl>
+                                              <p:pRg st="0" end="0"/>
+                                            </p:txEl>
+                                          </p:spTgt>
+                                        </p:tgtEl>
+                                        <p:attrNameLst>
+                                          <p:attrName>style.visibility</p:attrName>
+                                        </p:attrNameLst>
+                                      </p:cBhvr>
+                                      <p:to>
+                                        <p:strVal val="visible"/>
+                                      </p:to>
+                                    </p:set>
+                                  </p:childTnLst>
+                                </p:cTn>
+                              </p:par>
+                            </p:childTnLst>
+                          </p:cTn>
+                        </p:par>
+                        <p:par>
+                          <p:cTn id="10" fill="hold">
+                            <p:stCondLst>
+                              <p:cond delay="1000"/>
+                            </p:stCondLst>
+                            <p:childTnLst>
+                              <p:par>
+                                <p:cTn id="11" presetID="2" presetClass="entr" presetSubtype="4" fill="hold" nodeType="afterEffect">
+                                  <p:stCondLst>
+                                    <p:cond delay="2000"/>
+                                  </p:stCondLst>
+                                  <p:childTnLst>
+                                    <p:set>
+                                      <p:cBhvr>
+                                        <p:cTn id="12" dur="1" fill="hold">
+                                          <p:stCondLst>
+                                            <p:cond delay="0"/>
+                                          </p:stCondLst>
+                                        </p:cTn>
+                                        <p:tgtEl>
+                                          <p:spTgt spid="6"/>
+                                        </p:tgtEl>
+                                        <p:attrNameLst>
+                                          <p:attrName>style.visibility</p:attrName>
+                                        </p:attrNameLst>
+                                      </p:cBhvr>
+                                      <p:to>
+                                        <p:strVal val="visible"/>
+                                      </p:to>
+                                    </p:set>
+                                    <p:anim calcmode="lin" valueType="num">
+                                      <p:cBhvr additive="base">
+                                        <p:cTn id="13" dur="500" fill="hold"/>
+                                        <p:tgtEl>
+                                          <p:spTgt spid="6"/>
+                                        </p:tgtEl>
+                                        <p:attrNameLst>
+                                          <p:attrName>ppt_x</p:attrName>
+                                        </p:attrNameLst>
+                                      </p:cBhvr>
+                                      <p:tavLst>
+                                        <p:tav tm="0">
+                                          <p:val>
+                                            <p:strVal val="#ppt_x"/>
+                                          </p:val>
+                                        </p:tav>
+                                        <p:tav tm="100000">
+                                          <p:val>
+                                            <p:strVal val="#ppt_x"/>
+                                          </p:val>
+                                        </p:tav>
+                                      </p:tavLst>
+                                    </p:anim>
+                                    <p:anim calcmode="lin" valueType="num">
+                                      <p:cBhvr additive="base">
+                                        <p:cTn id="14" dur="500" fill="hold"/>
+                                        <p:tgtEl>
+                                          <p:spTgt spid="6"/>
+                                        </p:tgtEl>
+                                        <p:attrNameLst>
+                                          <p:attrName>ppt_y</p:attrName>
+                                        </p:attrNameLst>
+                                      </p:cBhvr>
+                                      <p:tavLst>
+                                        <p:tav tm="0">
+                                          <p:val>
+                                            <p:strVal val="1+#ppt_h/2"/>
+                                          </p:val>
+                                        </p:tav>
+                                        <p:tav tm="100000">
+                                          <p:val>
+                                            <p:strVal val="#ppt_y"/>
+                                          </p:val>
+                                        </p:tav>
+                                      </p:tavLst>
+                                    </p:anim>
+                                  </p:childTnLst>
+                                </p:cTn>
+                              </p:par>
+                            </p:childTnLst>
+                          </p:cTn>
+                        </p:par>
+                      </p:childTnLst>
+                    </p:cTn>
+                  </p:par>
+                </p:childTnLst>
+              </p:cTn>
+              <p:prevCondLst>
+                <p:cond evt="onPrev" delay="0">
+                  <p:tgtEl>
+                    <p:sldTgt/>
+                  </p:tgtEl>
+                </p:cond>
+              </p:prevCondLst>
+              <p:nextCondLst>
+                <p:cond evt="onNext" delay="0">
+                  <p:tgtEl>
+                    <p:sldTgt/>
+                  </p:tgtEl>
+                </p:cond>
+              </p:nextCondLst>
+            </p:seq>
+          </p:childTnLst>
+        </p:cTn>
+      </p:par>
+    </p:tnLst>
+    <p:bldLst>
+      <p:bldP spid="2" grpId="0"/>
+      <p:bldP spid="5" grpId="0" uiExpand="1" build="p"/>
+    </p:bldLst>
+  </p:timing>
+</p:sld>
+</file>
+
 <file path=ppt/slides/slide3.xml><?xml version="1.0" encoding="utf-8"?>
 <p:sld xmlns:a="http://schemas.openxmlformats.org/drawingml/2006/main" xmlns:r="http://schemas.openxmlformats.org/officeDocument/2006/relationships" xmlns:p="http://schemas.openxmlformats.org/presentationml/2006/main">
   <p:cSld>
@@ -12915,6 +15510,1404 @@
     <p:bldLst>
       <p:bldP spid="2" grpId="0"/>
       <p:bldP spid="3" grpId="0" uiExpand="1" build="p"/>
+    </p:bldLst>
+  </p:timing>
+</p:sld>
+</file>
+
+<file path=ppt/slides/slide30.xml><?xml version="1.0" encoding="utf-8"?>
+<p:sld xmlns:a="http://schemas.openxmlformats.org/drawingml/2006/main" xmlns:r="http://schemas.openxmlformats.org/officeDocument/2006/relationships" xmlns:p="http://schemas.openxmlformats.org/presentationml/2006/main">
+  <p:cSld>
+    <p:spTree>
+      <p:nvGrpSpPr>
+        <p:cNvPr id="1" name=""/>
+        <p:cNvGrpSpPr/>
+        <p:nvPr/>
+      </p:nvGrpSpPr>
+      <p:grpSpPr>
+        <a:xfrm>
+          <a:off x="0" y="0"/>
+          <a:ext cx="0" cy="0"/>
+          <a:chOff x="0" y="0"/>
+          <a:chExt cx="0" cy="0"/>
+        </a:xfrm>
+      </p:grpSpPr>
+      <p:sp>
+        <p:nvSpPr>
+          <p:cNvPr id="2" name="Titel 1">
+            <a:extLst>
+              <a:ext uri="{FF2B5EF4-FFF2-40B4-BE49-F238E27FC236}">
+                <a16:creationId xmlns:a16="http://schemas.microsoft.com/office/drawing/2014/main" id="{FA3A972D-933B-C180-D4AA-3ECFD5AC9CA4}"/>
+              </a:ext>
+            </a:extLst>
+          </p:cNvPr>
+          <p:cNvSpPr>
+            <a:spLocks noGrp="1"/>
+          </p:cNvSpPr>
+          <p:nvPr>
+            <p:ph type="title"/>
+          </p:nvPr>
+        </p:nvSpPr>
+        <p:spPr/>
+        <p:txBody>
+          <a:bodyPr/>
+          <a:lstStyle/>
+          <a:p>
+            <a:r>
+              <a:rPr lang="en-US" dirty="0">
+                <a:solidFill>
+                  <a:srgbClr val="000000"/>
+                </a:solidFill>
+                <a:latin typeface="AppleSystemUIFont"/>
+              </a:rPr>
+              <a:t>ROWNUM RN</a:t>
+            </a:r>
+          </a:p>
+        </p:txBody>
+      </p:sp>
+      <p:sp>
+        <p:nvSpPr>
+          <p:cNvPr id="3" name="Inhaltsplatzhalter 2">
+            <a:extLst>
+              <a:ext uri="{FF2B5EF4-FFF2-40B4-BE49-F238E27FC236}">
+                <a16:creationId xmlns:a16="http://schemas.microsoft.com/office/drawing/2014/main" id="{023EB78F-BDEC-EF5B-BE79-2559C5641761}"/>
+              </a:ext>
+            </a:extLst>
+          </p:cNvPr>
+          <p:cNvSpPr>
+            <a:spLocks noGrp="1"/>
+          </p:cNvSpPr>
+          <p:nvPr>
+            <p:ph idx="1"/>
+          </p:nvPr>
+        </p:nvSpPr>
+        <p:spPr/>
+        <p:txBody>
+          <a:bodyPr/>
+          <a:lstStyle/>
+          <a:p>
+            <a:r>
+              <a:rPr lang="de-AT" dirty="0"/>
+              <a:t>ROWNUM nummeriert alle Zeilen sequenziell ( z.B. 1,2,3,4,5 )</a:t>
+            </a:r>
+            <a:endParaRPr lang="en-US" dirty="0"/>
+          </a:p>
+        </p:txBody>
+      </p:sp>
+      <p:pic>
+        <p:nvPicPr>
+          <p:cNvPr id="5" name="Grafik 4">
+            <a:extLst>
+              <a:ext uri="{FF2B5EF4-FFF2-40B4-BE49-F238E27FC236}">
+                <a16:creationId xmlns:a16="http://schemas.microsoft.com/office/drawing/2014/main" id="{E8C02728-50A7-F526-8454-F99FF4A2D11F}"/>
+              </a:ext>
+            </a:extLst>
+          </p:cNvPr>
+          <p:cNvPicPr>
+            <a:picLocks noChangeAspect="1"/>
+          </p:cNvPicPr>
+          <p:nvPr/>
+        </p:nvPicPr>
+        <p:blipFill>
+          <a:blip r:embed="rId3"/>
+          <a:stretch>
+            <a:fillRect/>
+          </a:stretch>
+        </p:blipFill>
+        <p:spPr>
+          <a:xfrm>
+            <a:off x="838200" y="2454456"/>
+            <a:ext cx="9240078" cy="4060567"/>
+          </a:xfrm>
+          <a:prstGeom prst="rect">
+            <a:avLst/>
+          </a:prstGeom>
+        </p:spPr>
+      </p:pic>
+    </p:spTree>
+    <p:extLst>
+      <p:ext uri="{BB962C8B-B14F-4D97-AF65-F5344CB8AC3E}">
+        <p14:creationId xmlns:p14="http://schemas.microsoft.com/office/powerpoint/2010/main" val="3612838386"/>
+      </p:ext>
+    </p:extLst>
+  </p:cSld>
+  <p:clrMapOvr>
+    <a:masterClrMapping/>
+  </p:clrMapOvr>
+  <mc:AlternateContent xmlns:mc="http://schemas.openxmlformats.org/markup-compatibility/2006" xmlns:p14="http://schemas.microsoft.com/office/powerpoint/2010/main">
+    <mc:Choice Requires="p14">
+      <p:transition spd="slow" p14:dur="1500">
+        <p:split orient="vert"/>
+      </p:transition>
+    </mc:Choice>
+    <mc:Fallback xmlns="">
+      <p:transition spd="slow">
+        <p:split orient="vert"/>
+      </p:transition>
+    </mc:Fallback>
+  </mc:AlternateContent>
+  <p:timing>
+    <p:tnLst>
+      <p:par>
+        <p:cTn id="1" dur="indefinite" restart="never" nodeType="tmRoot">
+          <p:childTnLst>
+            <p:seq concurrent="1" nextAc="seek">
+              <p:cTn id="2" dur="indefinite" nodeType="mainSeq">
+                <p:childTnLst>
+                  <p:par>
+                    <p:cTn id="3" fill="hold">
+                      <p:stCondLst>
+                        <p:cond delay="indefinite"/>
+                        <p:cond evt="onBegin" delay="0">
+                          <p:tn val="2"/>
+                        </p:cond>
+                      </p:stCondLst>
+                      <p:childTnLst>
+                        <p:par>
+                          <p:cTn id="4" fill="hold">
+                            <p:stCondLst>
+                              <p:cond delay="0"/>
+                            </p:stCondLst>
+                            <p:childTnLst>
+                              <p:par>
+                                <p:cTn id="5" presetID="1" presetClass="entr" presetSubtype="0" fill="hold" grpId="0" nodeType="withEffect">
+                                  <p:stCondLst>
+                                    <p:cond delay="0"/>
+                                  </p:stCondLst>
+                                  <p:childTnLst>
+                                    <p:set>
+                                      <p:cBhvr>
+                                        <p:cTn id="6" dur="1" fill="hold">
+                                          <p:stCondLst>
+                                            <p:cond delay="0"/>
+                                          </p:stCondLst>
+                                        </p:cTn>
+                                        <p:tgtEl>
+                                          <p:spTgt spid="2"/>
+                                        </p:tgtEl>
+                                        <p:attrNameLst>
+                                          <p:attrName>style.visibility</p:attrName>
+                                        </p:attrNameLst>
+                                      </p:cBhvr>
+                                      <p:to>
+                                        <p:strVal val="visible"/>
+                                      </p:to>
+                                    </p:set>
+                                  </p:childTnLst>
+                                </p:cTn>
+                              </p:par>
+                            </p:childTnLst>
+                          </p:cTn>
+                        </p:par>
+                        <p:par>
+                          <p:cTn id="7" fill="hold">
+                            <p:stCondLst>
+                              <p:cond delay="0"/>
+                            </p:stCondLst>
+                            <p:childTnLst>
+                              <p:par>
+                                <p:cTn id="8" presetID="1" presetClass="entr" presetSubtype="0" fill="hold" grpId="0" nodeType="afterEffect">
+                                  <p:stCondLst>
+                                    <p:cond delay="1000"/>
+                                  </p:stCondLst>
+                                  <p:childTnLst>
+                                    <p:set>
+                                      <p:cBhvr>
+                                        <p:cTn id="9" dur="1" fill="hold">
+                                          <p:stCondLst>
+                                            <p:cond delay="0"/>
+                                          </p:stCondLst>
+                                        </p:cTn>
+                                        <p:tgtEl>
+                                          <p:spTgt spid="3">
+                                            <p:txEl>
+                                              <p:pRg st="0" end="0"/>
+                                            </p:txEl>
+                                          </p:spTgt>
+                                        </p:tgtEl>
+                                        <p:attrNameLst>
+                                          <p:attrName>style.visibility</p:attrName>
+                                        </p:attrNameLst>
+                                      </p:cBhvr>
+                                      <p:to>
+                                        <p:strVal val="visible"/>
+                                      </p:to>
+                                    </p:set>
+                                  </p:childTnLst>
+                                </p:cTn>
+                              </p:par>
+                            </p:childTnLst>
+                          </p:cTn>
+                        </p:par>
+                        <p:par>
+                          <p:cTn id="10" fill="hold">
+                            <p:stCondLst>
+                              <p:cond delay="1000"/>
+                            </p:stCondLst>
+                            <p:childTnLst>
+                              <p:par>
+                                <p:cTn id="11" presetID="2" presetClass="entr" presetSubtype="4" fill="hold" nodeType="afterEffect">
+                                  <p:stCondLst>
+                                    <p:cond delay="2000"/>
+                                  </p:stCondLst>
+                                  <p:childTnLst>
+                                    <p:set>
+                                      <p:cBhvr>
+                                        <p:cTn id="12" dur="1" fill="hold">
+                                          <p:stCondLst>
+                                            <p:cond delay="0"/>
+                                          </p:stCondLst>
+                                        </p:cTn>
+                                        <p:tgtEl>
+                                          <p:spTgt spid="5"/>
+                                        </p:tgtEl>
+                                        <p:attrNameLst>
+                                          <p:attrName>style.visibility</p:attrName>
+                                        </p:attrNameLst>
+                                      </p:cBhvr>
+                                      <p:to>
+                                        <p:strVal val="visible"/>
+                                      </p:to>
+                                    </p:set>
+                                    <p:anim calcmode="lin" valueType="num">
+                                      <p:cBhvr additive="base">
+                                        <p:cTn id="13" dur="500" fill="hold"/>
+                                        <p:tgtEl>
+                                          <p:spTgt spid="5"/>
+                                        </p:tgtEl>
+                                        <p:attrNameLst>
+                                          <p:attrName>ppt_x</p:attrName>
+                                        </p:attrNameLst>
+                                      </p:cBhvr>
+                                      <p:tavLst>
+                                        <p:tav tm="0">
+                                          <p:val>
+                                            <p:strVal val="#ppt_x"/>
+                                          </p:val>
+                                        </p:tav>
+                                        <p:tav tm="100000">
+                                          <p:val>
+                                            <p:strVal val="#ppt_x"/>
+                                          </p:val>
+                                        </p:tav>
+                                      </p:tavLst>
+                                    </p:anim>
+                                    <p:anim calcmode="lin" valueType="num">
+                                      <p:cBhvr additive="base">
+                                        <p:cTn id="14" dur="500" fill="hold"/>
+                                        <p:tgtEl>
+                                          <p:spTgt spid="5"/>
+                                        </p:tgtEl>
+                                        <p:attrNameLst>
+                                          <p:attrName>ppt_y</p:attrName>
+                                        </p:attrNameLst>
+                                      </p:cBhvr>
+                                      <p:tavLst>
+                                        <p:tav tm="0">
+                                          <p:val>
+                                            <p:strVal val="1+#ppt_h/2"/>
+                                          </p:val>
+                                        </p:tav>
+                                        <p:tav tm="100000">
+                                          <p:val>
+                                            <p:strVal val="#ppt_y"/>
+                                          </p:val>
+                                        </p:tav>
+                                      </p:tavLst>
+                                    </p:anim>
+                                  </p:childTnLst>
+                                </p:cTn>
+                              </p:par>
+                            </p:childTnLst>
+                          </p:cTn>
+                        </p:par>
+                      </p:childTnLst>
+                    </p:cTn>
+                  </p:par>
+                </p:childTnLst>
+              </p:cTn>
+              <p:prevCondLst>
+                <p:cond evt="onPrev" delay="0">
+                  <p:tgtEl>
+                    <p:sldTgt/>
+                  </p:tgtEl>
+                </p:cond>
+              </p:prevCondLst>
+              <p:nextCondLst>
+                <p:cond evt="onNext" delay="0">
+                  <p:tgtEl>
+                    <p:sldTgt/>
+                  </p:tgtEl>
+                </p:cond>
+              </p:nextCondLst>
+            </p:seq>
+          </p:childTnLst>
+        </p:cTn>
+      </p:par>
+    </p:tnLst>
+    <p:bldLst>
+      <p:bldP spid="2" grpId="0"/>
+      <p:bldP spid="3" grpId="0" uiExpand="1" build="p"/>
+    </p:bldLst>
+  </p:timing>
+</p:sld>
+</file>
+
+<file path=ppt/slides/slide31.xml><?xml version="1.0" encoding="utf-8"?>
+<p:sld xmlns:a="http://schemas.openxmlformats.org/drawingml/2006/main" xmlns:r="http://schemas.openxmlformats.org/officeDocument/2006/relationships" xmlns:p="http://schemas.openxmlformats.org/presentationml/2006/main">
+  <p:cSld>
+    <p:spTree>
+      <p:nvGrpSpPr>
+        <p:cNvPr id="1" name=""/>
+        <p:cNvGrpSpPr/>
+        <p:nvPr/>
+      </p:nvGrpSpPr>
+      <p:grpSpPr>
+        <a:xfrm>
+          <a:off x="0" y="0"/>
+          <a:ext cx="0" cy="0"/>
+          <a:chOff x="0" y="0"/>
+          <a:chExt cx="0" cy="0"/>
+        </a:xfrm>
+      </p:grpSpPr>
+      <p:sp>
+        <p:nvSpPr>
+          <p:cNvPr id="2" name="Titel 1">
+            <a:extLst>
+              <a:ext uri="{FF2B5EF4-FFF2-40B4-BE49-F238E27FC236}">
+                <a16:creationId xmlns:a16="http://schemas.microsoft.com/office/drawing/2014/main" id="{30E18F46-C54A-E89C-DCEE-900545176E26}"/>
+              </a:ext>
+            </a:extLst>
+          </p:cNvPr>
+          <p:cNvSpPr>
+            <a:spLocks noGrp="1"/>
+          </p:cNvSpPr>
+          <p:nvPr>
+            <p:ph type="title"/>
+          </p:nvPr>
+        </p:nvSpPr>
+        <p:spPr/>
+        <p:txBody>
+          <a:bodyPr/>
+          <a:lstStyle/>
+          <a:p>
+            <a:r>
+              <a:rPr lang="en-US" dirty="0">
+                <a:solidFill>
+                  <a:srgbClr val="000000"/>
+                </a:solidFill>
+                <a:latin typeface="AppleSystemUIFont"/>
+              </a:rPr>
+              <a:t>OFFSET / FETCH FIRST </a:t>
+            </a:r>
+          </a:p>
+        </p:txBody>
+      </p:sp>
+      <p:sp>
+        <p:nvSpPr>
+          <p:cNvPr id="3" name="Inhaltsplatzhalter 2">
+            <a:extLst>
+              <a:ext uri="{FF2B5EF4-FFF2-40B4-BE49-F238E27FC236}">
+                <a16:creationId xmlns:a16="http://schemas.microsoft.com/office/drawing/2014/main" id="{9B1C6626-147F-12C8-94E3-612666463ABD}"/>
+              </a:ext>
+            </a:extLst>
+          </p:cNvPr>
+          <p:cNvSpPr>
+            <a:spLocks noGrp="1"/>
+          </p:cNvSpPr>
+          <p:nvPr>
+            <p:ph idx="1"/>
+          </p:nvPr>
+        </p:nvSpPr>
+        <p:spPr>
+          <a:xfrm>
+            <a:off x="838200" y="1825624"/>
+            <a:ext cx="10515600" cy="5032375"/>
+          </a:xfrm>
+        </p:spPr>
+        <p:txBody>
+          <a:bodyPr/>
+          <a:lstStyle/>
+          <a:p>
+            <a:r>
+              <a:rPr lang="de-AT" dirty="0"/>
+              <a:t>Mit OFFSET gibt man die Zeilen zum Überspringen an</a:t>
+            </a:r>
+          </a:p>
+          <a:p>
+            <a:r>
+              <a:rPr lang="de-AT" dirty="0"/>
+              <a:t>Mit FETCH FIRST … ONLY gibt man die Menge zum Bewerten an</a:t>
+            </a:r>
+          </a:p>
+          <a:p>
+            <a:pPr marL="0" indent="0">
+              <a:buNone/>
+            </a:pPr>
+            <a:endParaRPr lang="de-AT" dirty="0"/>
+          </a:p>
+          <a:p>
+            <a:pPr marL="0" indent="0">
+              <a:buNone/>
+            </a:pPr>
+            <a:endParaRPr lang="de-AT" dirty="0"/>
+          </a:p>
+        </p:txBody>
+      </p:sp>
+      <p:pic>
+        <p:nvPicPr>
+          <p:cNvPr id="5" name="Grafik 4">
+            <a:extLst>
+              <a:ext uri="{FF2B5EF4-FFF2-40B4-BE49-F238E27FC236}">
+                <a16:creationId xmlns:a16="http://schemas.microsoft.com/office/drawing/2014/main" id="{B928AEBF-6D0D-B818-A635-A02AAE61DE90}"/>
+              </a:ext>
+            </a:extLst>
+          </p:cNvPr>
+          <p:cNvPicPr>
+            <a:picLocks noChangeAspect="1"/>
+          </p:cNvPicPr>
+          <p:nvPr/>
+        </p:nvPicPr>
+        <p:blipFill>
+          <a:blip r:embed="rId3"/>
+          <a:stretch>
+            <a:fillRect/>
+          </a:stretch>
+        </p:blipFill>
+        <p:spPr>
+          <a:xfrm>
+            <a:off x="1036983" y="2883176"/>
+            <a:ext cx="8246165" cy="3373882"/>
+          </a:xfrm>
+          <a:prstGeom prst="rect">
+            <a:avLst/>
+          </a:prstGeom>
+        </p:spPr>
+      </p:pic>
+    </p:spTree>
+    <p:extLst>
+      <p:ext uri="{BB962C8B-B14F-4D97-AF65-F5344CB8AC3E}">
+        <p14:creationId xmlns:p14="http://schemas.microsoft.com/office/powerpoint/2010/main" val="1555421170"/>
+      </p:ext>
+    </p:extLst>
+  </p:cSld>
+  <p:clrMapOvr>
+    <a:masterClrMapping/>
+  </p:clrMapOvr>
+  <mc:AlternateContent xmlns:mc="http://schemas.openxmlformats.org/markup-compatibility/2006" xmlns:p14="http://schemas.microsoft.com/office/powerpoint/2010/main">
+    <mc:Choice Requires="p14">
+      <p:transition spd="slow" p14:dur="1500">
+        <p:split orient="vert"/>
+      </p:transition>
+    </mc:Choice>
+    <mc:Fallback xmlns="">
+      <p:transition spd="slow">
+        <p:split orient="vert"/>
+      </p:transition>
+    </mc:Fallback>
+  </mc:AlternateContent>
+  <p:timing>
+    <p:tnLst>
+      <p:par>
+        <p:cTn id="1" dur="indefinite" restart="never" nodeType="tmRoot">
+          <p:childTnLst>
+            <p:seq concurrent="1" nextAc="seek">
+              <p:cTn id="2" dur="indefinite" nodeType="mainSeq">
+                <p:childTnLst>
+                  <p:par>
+                    <p:cTn id="3" fill="hold">
+                      <p:stCondLst>
+                        <p:cond delay="indefinite"/>
+                        <p:cond evt="onBegin" delay="0">
+                          <p:tn val="2"/>
+                        </p:cond>
+                      </p:stCondLst>
+                      <p:childTnLst>
+                        <p:par>
+                          <p:cTn id="4" fill="hold">
+                            <p:stCondLst>
+                              <p:cond delay="0"/>
+                            </p:stCondLst>
+                            <p:childTnLst>
+                              <p:par>
+                                <p:cTn id="5" presetID="1" presetClass="entr" presetSubtype="0" fill="hold" grpId="0" nodeType="withEffect">
+                                  <p:stCondLst>
+                                    <p:cond delay="0"/>
+                                  </p:stCondLst>
+                                  <p:childTnLst>
+                                    <p:set>
+                                      <p:cBhvr>
+                                        <p:cTn id="6" dur="1" fill="hold">
+                                          <p:stCondLst>
+                                            <p:cond delay="0"/>
+                                          </p:stCondLst>
+                                        </p:cTn>
+                                        <p:tgtEl>
+                                          <p:spTgt spid="2"/>
+                                        </p:tgtEl>
+                                        <p:attrNameLst>
+                                          <p:attrName>style.visibility</p:attrName>
+                                        </p:attrNameLst>
+                                      </p:cBhvr>
+                                      <p:to>
+                                        <p:strVal val="visible"/>
+                                      </p:to>
+                                    </p:set>
+                                  </p:childTnLst>
+                                </p:cTn>
+                              </p:par>
+                            </p:childTnLst>
+                          </p:cTn>
+                        </p:par>
+                        <p:par>
+                          <p:cTn id="7" fill="hold">
+                            <p:stCondLst>
+                              <p:cond delay="0"/>
+                            </p:stCondLst>
+                            <p:childTnLst>
+                              <p:par>
+                                <p:cTn id="8" presetID="1" presetClass="entr" presetSubtype="0" fill="hold" grpId="0" nodeType="afterEffect">
+                                  <p:stCondLst>
+                                    <p:cond delay="1000"/>
+                                  </p:stCondLst>
+                                  <p:childTnLst>
+                                    <p:set>
+                                      <p:cBhvr>
+                                        <p:cTn id="9" dur="1" fill="hold">
+                                          <p:stCondLst>
+                                            <p:cond delay="0"/>
+                                          </p:stCondLst>
+                                        </p:cTn>
+                                        <p:tgtEl>
+                                          <p:spTgt spid="3">
+                                            <p:txEl>
+                                              <p:pRg st="0" end="0"/>
+                                            </p:txEl>
+                                          </p:spTgt>
+                                        </p:tgtEl>
+                                        <p:attrNameLst>
+                                          <p:attrName>style.visibility</p:attrName>
+                                        </p:attrNameLst>
+                                      </p:cBhvr>
+                                      <p:to>
+                                        <p:strVal val="visible"/>
+                                      </p:to>
+                                    </p:set>
+                                  </p:childTnLst>
+                                </p:cTn>
+                              </p:par>
+                            </p:childTnLst>
+                          </p:cTn>
+                        </p:par>
+                        <p:par>
+                          <p:cTn id="10" fill="hold">
+                            <p:stCondLst>
+                              <p:cond delay="1000"/>
+                            </p:stCondLst>
+                            <p:childTnLst>
+                              <p:par>
+                                <p:cTn id="11" presetID="1" presetClass="entr" presetSubtype="0" fill="hold" grpId="0" nodeType="afterEffect">
+                                  <p:stCondLst>
+                                    <p:cond delay="1000"/>
+                                  </p:stCondLst>
+                                  <p:childTnLst>
+                                    <p:set>
+                                      <p:cBhvr>
+                                        <p:cTn id="12" dur="1" fill="hold">
+                                          <p:stCondLst>
+                                            <p:cond delay="0"/>
+                                          </p:stCondLst>
+                                        </p:cTn>
+                                        <p:tgtEl>
+                                          <p:spTgt spid="3">
+                                            <p:txEl>
+                                              <p:pRg st="1" end="1"/>
+                                            </p:txEl>
+                                          </p:spTgt>
+                                        </p:tgtEl>
+                                        <p:attrNameLst>
+                                          <p:attrName>style.visibility</p:attrName>
+                                        </p:attrNameLst>
+                                      </p:cBhvr>
+                                      <p:to>
+                                        <p:strVal val="visible"/>
+                                      </p:to>
+                                    </p:set>
+                                  </p:childTnLst>
+                                </p:cTn>
+                              </p:par>
+                            </p:childTnLst>
+                          </p:cTn>
+                        </p:par>
+                        <p:par>
+                          <p:cTn id="13" fill="hold">
+                            <p:stCondLst>
+                              <p:cond delay="2000"/>
+                            </p:stCondLst>
+                            <p:childTnLst>
+                              <p:par>
+                                <p:cTn id="14" presetID="2" presetClass="entr" presetSubtype="4" fill="hold" nodeType="afterEffect">
+                                  <p:stCondLst>
+                                    <p:cond delay="2000"/>
+                                  </p:stCondLst>
+                                  <p:childTnLst>
+                                    <p:set>
+                                      <p:cBhvr>
+                                        <p:cTn id="15" dur="1" fill="hold">
+                                          <p:stCondLst>
+                                            <p:cond delay="0"/>
+                                          </p:stCondLst>
+                                        </p:cTn>
+                                        <p:tgtEl>
+                                          <p:spTgt spid="5"/>
+                                        </p:tgtEl>
+                                        <p:attrNameLst>
+                                          <p:attrName>style.visibility</p:attrName>
+                                        </p:attrNameLst>
+                                      </p:cBhvr>
+                                      <p:to>
+                                        <p:strVal val="visible"/>
+                                      </p:to>
+                                    </p:set>
+                                    <p:anim calcmode="lin" valueType="num">
+                                      <p:cBhvr additive="base">
+                                        <p:cTn id="16" dur="500" fill="hold"/>
+                                        <p:tgtEl>
+                                          <p:spTgt spid="5"/>
+                                        </p:tgtEl>
+                                        <p:attrNameLst>
+                                          <p:attrName>ppt_x</p:attrName>
+                                        </p:attrNameLst>
+                                      </p:cBhvr>
+                                      <p:tavLst>
+                                        <p:tav tm="0">
+                                          <p:val>
+                                            <p:strVal val="#ppt_x"/>
+                                          </p:val>
+                                        </p:tav>
+                                        <p:tav tm="100000">
+                                          <p:val>
+                                            <p:strVal val="#ppt_x"/>
+                                          </p:val>
+                                        </p:tav>
+                                      </p:tavLst>
+                                    </p:anim>
+                                    <p:anim calcmode="lin" valueType="num">
+                                      <p:cBhvr additive="base">
+                                        <p:cTn id="17" dur="500" fill="hold"/>
+                                        <p:tgtEl>
+                                          <p:spTgt spid="5"/>
+                                        </p:tgtEl>
+                                        <p:attrNameLst>
+                                          <p:attrName>ppt_y</p:attrName>
+                                        </p:attrNameLst>
+                                      </p:cBhvr>
+                                      <p:tavLst>
+                                        <p:tav tm="0">
+                                          <p:val>
+                                            <p:strVal val="1+#ppt_h/2"/>
+                                          </p:val>
+                                        </p:tav>
+                                        <p:tav tm="100000">
+                                          <p:val>
+                                            <p:strVal val="#ppt_y"/>
+                                          </p:val>
+                                        </p:tav>
+                                      </p:tavLst>
+                                    </p:anim>
+                                  </p:childTnLst>
+                                </p:cTn>
+                              </p:par>
+                            </p:childTnLst>
+                          </p:cTn>
+                        </p:par>
+                      </p:childTnLst>
+                    </p:cTn>
+                  </p:par>
+                </p:childTnLst>
+              </p:cTn>
+              <p:prevCondLst>
+                <p:cond evt="onPrev" delay="0">
+                  <p:tgtEl>
+                    <p:sldTgt/>
+                  </p:tgtEl>
+                </p:cond>
+              </p:prevCondLst>
+              <p:nextCondLst>
+                <p:cond evt="onNext" delay="0">
+                  <p:tgtEl>
+                    <p:sldTgt/>
+                  </p:tgtEl>
+                </p:cond>
+              </p:nextCondLst>
+            </p:seq>
+          </p:childTnLst>
+        </p:cTn>
+      </p:par>
+    </p:tnLst>
+    <p:bldLst>
+      <p:bldP spid="2" grpId="0"/>
+      <p:bldP spid="3" grpId="0" build="p"/>
+    </p:bldLst>
+  </p:timing>
+</p:sld>
+</file>
+
+<file path=ppt/slides/slide32.xml><?xml version="1.0" encoding="utf-8"?>
+<p:sld xmlns:a="http://schemas.openxmlformats.org/drawingml/2006/main" xmlns:r="http://schemas.openxmlformats.org/officeDocument/2006/relationships" xmlns:p="http://schemas.openxmlformats.org/presentationml/2006/main">
+  <p:cSld>
+    <p:spTree>
+      <p:nvGrpSpPr>
+        <p:cNvPr id="1" name=""/>
+        <p:cNvGrpSpPr/>
+        <p:nvPr/>
+      </p:nvGrpSpPr>
+      <p:grpSpPr>
+        <a:xfrm>
+          <a:off x="0" y="0"/>
+          <a:ext cx="0" cy="0"/>
+          <a:chOff x="0" y="0"/>
+          <a:chExt cx="0" cy="0"/>
+        </a:xfrm>
+      </p:grpSpPr>
+      <p:sp>
+        <p:nvSpPr>
+          <p:cNvPr id="2" name="Titel 1">
+            <a:extLst>
+              <a:ext uri="{FF2B5EF4-FFF2-40B4-BE49-F238E27FC236}">
+                <a16:creationId xmlns:a16="http://schemas.microsoft.com/office/drawing/2014/main" id="{CF1CD0C8-E427-1663-98E5-F8576744426D}"/>
+              </a:ext>
+            </a:extLst>
+          </p:cNvPr>
+          <p:cNvSpPr>
+            <a:spLocks noGrp="1"/>
+          </p:cNvSpPr>
+          <p:nvPr>
+            <p:ph type="title"/>
+          </p:nvPr>
+        </p:nvSpPr>
+        <p:spPr/>
+        <p:txBody>
+          <a:bodyPr/>
+          <a:lstStyle/>
+          <a:p>
+            <a:r>
+              <a:rPr lang="en-US" dirty="0">
+                <a:solidFill>
+                  <a:srgbClr val="000000"/>
+                </a:solidFill>
+                <a:latin typeface="AppleSystemUIFont"/>
+              </a:rPr>
+              <a:t>Window-</a:t>
+            </a:r>
+            <a:r>
+              <a:rPr lang="en-US" dirty="0" err="1">
+                <a:solidFill>
+                  <a:srgbClr val="000000"/>
+                </a:solidFill>
+                <a:latin typeface="AppleSystemUIFont"/>
+              </a:rPr>
+              <a:t>Funktionen</a:t>
+            </a:r>
+            <a:endParaRPr lang="en-US" dirty="0"/>
+          </a:p>
+        </p:txBody>
+      </p:sp>
+      <p:sp>
+        <p:nvSpPr>
+          <p:cNvPr id="3" name="Inhaltsplatzhalter 2">
+            <a:extLst>
+              <a:ext uri="{FF2B5EF4-FFF2-40B4-BE49-F238E27FC236}">
+                <a16:creationId xmlns:a16="http://schemas.microsoft.com/office/drawing/2014/main" id="{723FA55B-550B-6A6D-9F7B-B2100D15A6CB}"/>
+              </a:ext>
+            </a:extLst>
+          </p:cNvPr>
+          <p:cNvSpPr>
+            <a:spLocks noGrp="1"/>
+          </p:cNvSpPr>
+          <p:nvPr>
+            <p:ph idx="1"/>
+          </p:nvPr>
+        </p:nvSpPr>
+        <p:spPr/>
+        <p:txBody>
+          <a:bodyPr/>
+          <a:lstStyle/>
+          <a:p>
+            <a:r>
+              <a:rPr lang="de-AT" dirty="0"/>
+              <a:t>Mit Hilfe von </a:t>
+            </a:r>
+            <a:r>
+              <a:rPr lang="de-AT" dirty="0" err="1"/>
+              <a:t>Window</a:t>
+            </a:r>
+            <a:r>
+              <a:rPr lang="de-AT" dirty="0"/>
+              <a:t>-Funktionen kann man Berechnungen für Abschnitte eines Ergebnisses durchführen</a:t>
+            </a:r>
+            <a:endParaRPr lang="en-US" dirty="0"/>
+          </a:p>
+        </p:txBody>
+      </p:sp>
+      <p:pic>
+        <p:nvPicPr>
+          <p:cNvPr id="5" name="Grafik 4">
+            <a:extLst>
+              <a:ext uri="{FF2B5EF4-FFF2-40B4-BE49-F238E27FC236}">
+                <a16:creationId xmlns:a16="http://schemas.microsoft.com/office/drawing/2014/main" id="{F530D034-FA5B-7715-1686-3071A7F3D77C}"/>
+              </a:ext>
+            </a:extLst>
+          </p:cNvPr>
+          <p:cNvPicPr>
+            <a:picLocks noChangeAspect="1"/>
+          </p:cNvPicPr>
+          <p:nvPr/>
+        </p:nvPicPr>
+        <p:blipFill>
+          <a:blip r:embed="rId3"/>
+          <a:stretch>
+            <a:fillRect/>
+          </a:stretch>
+        </p:blipFill>
+        <p:spPr>
+          <a:xfrm>
+            <a:off x="255662" y="2990765"/>
+            <a:ext cx="11680675" cy="3186198"/>
+          </a:xfrm>
+          <a:prstGeom prst="rect">
+            <a:avLst/>
+          </a:prstGeom>
+        </p:spPr>
+      </p:pic>
+    </p:spTree>
+    <p:extLst>
+      <p:ext uri="{BB962C8B-B14F-4D97-AF65-F5344CB8AC3E}">
+        <p14:creationId xmlns:p14="http://schemas.microsoft.com/office/powerpoint/2010/main" val="3097838768"/>
+      </p:ext>
+    </p:extLst>
+  </p:cSld>
+  <p:clrMapOvr>
+    <a:masterClrMapping/>
+  </p:clrMapOvr>
+  <mc:AlternateContent xmlns:mc="http://schemas.openxmlformats.org/markup-compatibility/2006" xmlns:p14="http://schemas.microsoft.com/office/powerpoint/2010/main">
+    <mc:Choice Requires="p14">
+      <p:transition spd="slow" p14:dur="1500">
+        <p:split orient="vert"/>
+      </p:transition>
+    </mc:Choice>
+    <mc:Fallback xmlns="">
+      <p:transition spd="slow">
+        <p:split orient="vert"/>
+      </p:transition>
+    </mc:Fallback>
+  </mc:AlternateContent>
+  <p:timing>
+    <p:tnLst>
+      <p:par>
+        <p:cTn id="1" dur="indefinite" restart="never" nodeType="tmRoot">
+          <p:childTnLst>
+            <p:seq concurrent="1" nextAc="seek">
+              <p:cTn id="2" dur="indefinite" nodeType="mainSeq">
+                <p:childTnLst>
+                  <p:par>
+                    <p:cTn id="3" fill="hold">
+                      <p:stCondLst>
+                        <p:cond delay="indefinite"/>
+                        <p:cond evt="onBegin" delay="0">
+                          <p:tn val="2"/>
+                        </p:cond>
+                      </p:stCondLst>
+                      <p:childTnLst>
+                        <p:par>
+                          <p:cTn id="4" fill="hold">
+                            <p:stCondLst>
+                              <p:cond delay="0"/>
+                            </p:stCondLst>
+                            <p:childTnLst>
+                              <p:par>
+                                <p:cTn id="5" presetID="1" presetClass="entr" presetSubtype="0" fill="hold" grpId="0" nodeType="afterEffect">
+                                  <p:stCondLst>
+                                    <p:cond delay="0"/>
+                                  </p:stCondLst>
+                                  <p:childTnLst>
+                                    <p:set>
+                                      <p:cBhvr>
+                                        <p:cTn id="6" dur="1" fill="hold">
+                                          <p:stCondLst>
+                                            <p:cond delay="0"/>
+                                          </p:stCondLst>
+                                        </p:cTn>
+                                        <p:tgtEl>
+                                          <p:spTgt spid="2"/>
+                                        </p:tgtEl>
+                                        <p:attrNameLst>
+                                          <p:attrName>style.visibility</p:attrName>
+                                        </p:attrNameLst>
+                                      </p:cBhvr>
+                                      <p:to>
+                                        <p:strVal val="visible"/>
+                                      </p:to>
+                                    </p:set>
+                                  </p:childTnLst>
+                                </p:cTn>
+                              </p:par>
+                            </p:childTnLst>
+                          </p:cTn>
+                        </p:par>
+                        <p:par>
+                          <p:cTn id="7" fill="hold">
+                            <p:stCondLst>
+                              <p:cond delay="0"/>
+                            </p:stCondLst>
+                            <p:childTnLst>
+                              <p:par>
+                                <p:cTn id="8" presetID="1" presetClass="entr" presetSubtype="0" fill="hold" grpId="0" nodeType="afterEffect">
+                                  <p:stCondLst>
+                                    <p:cond delay="1000"/>
+                                  </p:stCondLst>
+                                  <p:childTnLst>
+                                    <p:set>
+                                      <p:cBhvr>
+                                        <p:cTn id="9" dur="1" fill="hold">
+                                          <p:stCondLst>
+                                            <p:cond delay="0"/>
+                                          </p:stCondLst>
+                                        </p:cTn>
+                                        <p:tgtEl>
+                                          <p:spTgt spid="3">
+                                            <p:txEl>
+                                              <p:pRg st="0" end="0"/>
+                                            </p:txEl>
+                                          </p:spTgt>
+                                        </p:tgtEl>
+                                        <p:attrNameLst>
+                                          <p:attrName>style.visibility</p:attrName>
+                                        </p:attrNameLst>
+                                      </p:cBhvr>
+                                      <p:to>
+                                        <p:strVal val="visible"/>
+                                      </p:to>
+                                    </p:set>
+                                  </p:childTnLst>
+                                </p:cTn>
+                              </p:par>
+                            </p:childTnLst>
+                          </p:cTn>
+                        </p:par>
+                        <p:par>
+                          <p:cTn id="10" fill="hold">
+                            <p:stCondLst>
+                              <p:cond delay="1000"/>
+                            </p:stCondLst>
+                            <p:childTnLst>
+                              <p:par>
+                                <p:cTn id="11" presetID="2" presetClass="entr" presetSubtype="4" fill="hold" nodeType="afterEffect">
+                                  <p:stCondLst>
+                                    <p:cond delay="2000"/>
+                                  </p:stCondLst>
+                                  <p:childTnLst>
+                                    <p:set>
+                                      <p:cBhvr>
+                                        <p:cTn id="12" dur="1" fill="hold">
+                                          <p:stCondLst>
+                                            <p:cond delay="0"/>
+                                          </p:stCondLst>
+                                        </p:cTn>
+                                        <p:tgtEl>
+                                          <p:spTgt spid="5"/>
+                                        </p:tgtEl>
+                                        <p:attrNameLst>
+                                          <p:attrName>style.visibility</p:attrName>
+                                        </p:attrNameLst>
+                                      </p:cBhvr>
+                                      <p:to>
+                                        <p:strVal val="visible"/>
+                                      </p:to>
+                                    </p:set>
+                                    <p:anim calcmode="lin" valueType="num">
+                                      <p:cBhvr additive="base">
+                                        <p:cTn id="13" dur="500" fill="hold"/>
+                                        <p:tgtEl>
+                                          <p:spTgt spid="5"/>
+                                        </p:tgtEl>
+                                        <p:attrNameLst>
+                                          <p:attrName>ppt_x</p:attrName>
+                                        </p:attrNameLst>
+                                      </p:cBhvr>
+                                      <p:tavLst>
+                                        <p:tav tm="0">
+                                          <p:val>
+                                            <p:strVal val="#ppt_x"/>
+                                          </p:val>
+                                        </p:tav>
+                                        <p:tav tm="100000">
+                                          <p:val>
+                                            <p:strVal val="#ppt_x"/>
+                                          </p:val>
+                                        </p:tav>
+                                      </p:tavLst>
+                                    </p:anim>
+                                    <p:anim calcmode="lin" valueType="num">
+                                      <p:cBhvr additive="base">
+                                        <p:cTn id="14" dur="500" fill="hold"/>
+                                        <p:tgtEl>
+                                          <p:spTgt spid="5"/>
+                                        </p:tgtEl>
+                                        <p:attrNameLst>
+                                          <p:attrName>ppt_y</p:attrName>
+                                        </p:attrNameLst>
+                                      </p:cBhvr>
+                                      <p:tavLst>
+                                        <p:tav tm="0">
+                                          <p:val>
+                                            <p:strVal val="1+#ppt_h/2"/>
+                                          </p:val>
+                                        </p:tav>
+                                        <p:tav tm="100000">
+                                          <p:val>
+                                            <p:strVal val="#ppt_y"/>
+                                          </p:val>
+                                        </p:tav>
+                                      </p:tavLst>
+                                    </p:anim>
+                                  </p:childTnLst>
+                                </p:cTn>
+                              </p:par>
+                            </p:childTnLst>
+                          </p:cTn>
+                        </p:par>
+                      </p:childTnLst>
+                    </p:cTn>
+                  </p:par>
+                </p:childTnLst>
+              </p:cTn>
+              <p:prevCondLst>
+                <p:cond evt="onPrev" delay="0">
+                  <p:tgtEl>
+                    <p:sldTgt/>
+                  </p:tgtEl>
+                </p:cond>
+              </p:prevCondLst>
+              <p:nextCondLst>
+                <p:cond evt="onNext" delay="0">
+                  <p:tgtEl>
+                    <p:sldTgt/>
+                  </p:tgtEl>
+                </p:cond>
+              </p:nextCondLst>
+            </p:seq>
+          </p:childTnLst>
+        </p:cTn>
+      </p:par>
+    </p:tnLst>
+    <p:bldLst>
+      <p:bldP spid="2" grpId="0"/>
+      <p:bldP spid="3" grpId="0" build="p"/>
+    </p:bldLst>
+  </p:timing>
+</p:sld>
+</file>
+
+<file path=ppt/slides/slide33.xml><?xml version="1.0" encoding="utf-8"?>
+<p:sld xmlns:a="http://schemas.openxmlformats.org/drawingml/2006/main" xmlns:r="http://schemas.openxmlformats.org/officeDocument/2006/relationships" xmlns:p="http://schemas.openxmlformats.org/presentationml/2006/main">
+  <p:cSld>
+    <p:spTree>
+      <p:nvGrpSpPr>
+        <p:cNvPr id="1" name=""/>
+        <p:cNvGrpSpPr/>
+        <p:nvPr/>
+      </p:nvGrpSpPr>
+      <p:grpSpPr>
+        <a:xfrm>
+          <a:off x="0" y="0"/>
+          <a:ext cx="0" cy="0"/>
+          <a:chOff x="0" y="0"/>
+          <a:chExt cx="0" cy="0"/>
+        </a:xfrm>
+      </p:grpSpPr>
+      <p:sp>
+        <p:nvSpPr>
+          <p:cNvPr id="2" name="Titel 1">
+            <a:extLst>
+              <a:ext uri="{FF2B5EF4-FFF2-40B4-BE49-F238E27FC236}">
+                <a16:creationId xmlns:a16="http://schemas.microsoft.com/office/drawing/2014/main" id="{CF1CD0C8-E427-1663-98E5-F8576744426D}"/>
+              </a:ext>
+            </a:extLst>
+          </p:cNvPr>
+          <p:cNvSpPr>
+            <a:spLocks noGrp="1"/>
+          </p:cNvSpPr>
+          <p:nvPr>
+            <p:ph type="title"/>
+          </p:nvPr>
+        </p:nvSpPr>
+        <p:spPr/>
+        <p:txBody>
+          <a:bodyPr>
+            <a:normAutofit fontScale="90000"/>
+          </a:bodyPr>
+          <a:lstStyle/>
+          <a:p>
+            <a:r>
+              <a:rPr lang="en-US" dirty="0">
+                <a:solidFill>
+                  <a:srgbClr val="000000"/>
+                </a:solidFill>
+                <a:latin typeface="AppleSystemUIFont"/>
+              </a:rPr>
+              <a:t>Window-</a:t>
+            </a:r>
+            <a:r>
+              <a:rPr lang="en-US" dirty="0" err="1">
+                <a:solidFill>
+                  <a:srgbClr val="000000"/>
+                </a:solidFill>
+                <a:latin typeface="AppleSystemUIFont"/>
+              </a:rPr>
+              <a:t>Funktionen</a:t>
+            </a:r>
+            <a:br>
+              <a:rPr lang="en-US" dirty="0">
+                <a:solidFill>
+                  <a:srgbClr val="000000"/>
+                </a:solidFill>
+                <a:latin typeface="AppleSystemUIFont"/>
+              </a:rPr>
+            </a:br>
+            <a:r>
+              <a:rPr lang="en-US" dirty="0">
+                <a:solidFill>
+                  <a:srgbClr val="000000"/>
+                </a:solidFill>
+                <a:latin typeface="AppleSystemUIFont"/>
+              </a:rPr>
+              <a:t> </a:t>
+            </a:r>
+            <a:r>
+              <a:rPr lang="de-AT" dirty="0"/>
+              <a:t>Das führt zum folgenden Ergebnis:</a:t>
+            </a:r>
+            <a:br>
+              <a:rPr lang="de-AT" dirty="0"/>
+            </a:br>
+            <a:endParaRPr lang="en-US" dirty="0"/>
+          </a:p>
+        </p:txBody>
+      </p:sp>
+      <p:pic>
+        <p:nvPicPr>
+          <p:cNvPr id="6" name="Grafik 5">
+            <a:extLst>
+              <a:ext uri="{FF2B5EF4-FFF2-40B4-BE49-F238E27FC236}">
+                <a16:creationId xmlns:a16="http://schemas.microsoft.com/office/drawing/2014/main" id="{024F0B5F-89C8-F22B-6A95-EB8D03AE8D20}"/>
+              </a:ext>
+            </a:extLst>
+          </p:cNvPr>
+          <p:cNvPicPr>
+            <a:picLocks noChangeAspect="1"/>
+          </p:cNvPicPr>
+          <p:nvPr/>
+        </p:nvPicPr>
+        <p:blipFill>
+          <a:blip r:embed="rId3"/>
+          <a:stretch>
+            <a:fillRect/>
+          </a:stretch>
+        </p:blipFill>
+        <p:spPr>
+          <a:xfrm>
+            <a:off x="977347" y="1331333"/>
+            <a:ext cx="10376453" cy="4989917"/>
+          </a:xfrm>
+          <a:prstGeom prst="rect">
+            <a:avLst/>
+          </a:prstGeom>
+        </p:spPr>
+      </p:pic>
+    </p:spTree>
+    <p:extLst>
+      <p:ext uri="{BB962C8B-B14F-4D97-AF65-F5344CB8AC3E}">
+        <p14:creationId xmlns:p14="http://schemas.microsoft.com/office/powerpoint/2010/main" val="3241162369"/>
+      </p:ext>
+    </p:extLst>
+  </p:cSld>
+  <p:clrMapOvr>
+    <a:masterClrMapping/>
+  </p:clrMapOvr>
+  <mc:AlternateContent xmlns:mc="http://schemas.openxmlformats.org/markup-compatibility/2006" xmlns:p14="http://schemas.microsoft.com/office/powerpoint/2010/main">
+    <mc:Choice Requires="p14">
+      <p:transition spd="slow" p14:dur="1500">
+        <p:split orient="vert"/>
+      </p:transition>
+    </mc:Choice>
+    <mc:Fallback xmlns="">
+      <p:transition spd="slow">
+        <p:split orient="vert"/>
+      </p:transition>
+    </mc:Fallback>
+  </mc:AlternateContent>
+  <p:timing>
+    <p:tnLst>
+      <p:par>
+        <p:cTn id="1" dur="indefinite" restart="never" nodeType="tmRoot">
+          <p:childTnLst>
+            <p:seq concurrent="1" nextAc="seek">
+              <p:cTn id="2" dur="indefinite" nodeType="mainSeq">
+                <p:childTnLst>
+                  <p:par>
+                    <p:cTn id="3" fill="hold">
+                      <p:stCondLst>
+                        <p:cond delay="indefinite"/>
+                        <p:cond evt="onBegin" delay="0">
+                          <p:tn val="2"/>
+                        </p:cond>
+                      </p:stCondLst>
+                      <p:childTnLst>
+                        <p:par>
+                          <p:cTn id="4" fill="hold">
+                            <p:stCondLst>
+                              <p:cond delay="0"/>
+                            </p:stCondLst>
+                            <p:childTnLst>
+                              <p:par>
+                                <p:cTn id="5" presetID="1" presetClass="entr" presetSubtype="0" fill="hold" grpId="0" nodeType="afterEffect">
+                                  <p:stCondLst>
+                                    <p:cond delay="0"/>
+                                  </p:stCondLst>
+                                  <p:childTnLst>
+                                    <p:set>
+                                      <p:cBhvr>
+                                        <p:cTn id="6" dur="1" fill="hold">
+                                          <p:stCondLst>
+                                            <p:cond delay="0"/>
+                                          </p:stCondLst>
+                                        </p:cTn>
+                                        <p:tgtEl>
+                                          <p:spTgt spid="2"/>
+                                        </p:tgtEl>
+                                        <p:attrNameLst>
+                                          <p:attrName>style.visibility</p:attrName>
+                                        </p:attrNameLst>
+                                      </p:cBhvr>
+                                      <p:to>
+                                        <p:strVal val="visible"/>
+                                      </p:to>
+                                    </p:set>
+                                  </p:childTnLst>
+                                </p:cTn>
+                              </p:par>
+                            </p:childTnLst>
+                          </p:cTn>
+                        </p:par>
+                        <p:par>
+                          <p:cTn id="7" fill="hold">
+                            <p:stCondLst>
+                              <p:cond delay="0"/>
+                            </p:stCondLst>
+                            <p:childTnLst>
+                              <p:par>
+                                <p:cTn id="8" presetID="2" presetClass="entr" presetSubtype="4" fill="hold" nodeType="afterEffect">
+                                  <p:stCondLst>
+                                    <p:cond delay="1000"/>
+                                  </p:stCondLst>
+                                  <p:childTnLst>
+                                    <p:set>
+                                      <p:cBhvr>
+                                        <p:cTn id="9" dur="1" fill="hold">
+                                          <p:stCondLst>
+                                            <p:cond delay="0"/>
+                                          </p:stCondLst>
+                                        </p:cTn>
+                                        <p:tgtEl>
+                                          <p:spTgt spid="6"/>
+                                        </p:tgtEl>
+                                        <p:attrNameLst>
+                                          <p:attrName>style.visibility</p:attrName>
+                                        </p:attrNameLst>
+                                      </p:cBhvr>
+                                      <p:to>
+                                        <p:strVal val="visible"/>
+                                      </p:to>
+                                    </p:set>
+                                    <p:anim calcmode="lin" valueType="num">
+                                      <p:cBhvr additive="base">
+                                        <p:cTn id="10" dur="500" fill="hold"/>
+                                        <p:tgtEl>
+                                          <p:spTgt spid="6"/>
+                                        </p:tgtEl>
+                                        <p:attrNameLst>
+                                          <p:attrName>ppt_x</p:attrName>
+                                        </p:attrNameLst>
+                                      </p:cBhvr>
+                                      <p:tavLst>
+                                        <p:tav tm="0">
+                                          <p:val>
+                                            <p:strVal val="#ppt_x"/>
+                                          </p:val>
+                                        </p:tav>
+                                        <p:tav tm="100000">
+                                          <p:val>
+                                            <p:strVal val="#ppt_x"/>
+                                          </p:val>
+                                        </p:tav>
+                                      </p:tavLst>
+                                    </p:anim>
+                                    <p:anim calcmode="lin" valueType="num">
+                                      <p:cBhvr additive="base">
+                                        <p:cTn id="11" dur="500" fill="hold"/>
+                                        <p:tgtEl>
+                                          <p:spTgt spid="6"/>
+                                        </p:tgtEl>
+                                        <p:attrNameLst>
+                                          <p:attrName>ppt_y</p:attrName>
+                                        </p:attrNameLst>
+                                      </p:cBhvr>
+                                      <p:tavLst>
+                                        <p:tav tm="0">
+                                          <p:val>
+                                            <p:strVal val="1+#ppt_h/2"/>
+                                          </p:val>
+                                        </p:tav>
+                                        <p:tav tm="100000">
+                                          <p:val>
+                                            <p:strVal val="#ppt_y"/>
+                                          </p:val>
+                                        </p:tav>
+                                      </p:tavLst>
+                                    </p:anim>
+                                  </p:childTnLst>
+                                </p:cTn>
+                              </p:par>
+                            </p:childTnLst>
+                          </p:cTn>
+                        </p:par>
+                      </p:childTnLst>
+                    </p:cTn>
+                  </p:par>
+                </p:childTnLst>
+              </p:cTn>
+              <p:prevCondLst>
+                <p:cond evt="onPrev" delay="0">
+                  <p:tgtEl>
+                    <p:sldTgt/>
+                  </p:tgtEl>
+                </p:cond>
+              </p:prevCondLst>
+              <p:nextCondLst>
+                <p:cond evt="onNext" delay="0">
+                  <p:tgtEl>
+                    <p:sldTgt/>
+                  </p:tgtEl>
+                </p:cond>
+              </p:nextCondLst>
+            </p:seq>
+          </p:childTnLst>
+        </p:cTn>
+      </p:par>
+    </p:tnLst>
+    <p:bldLst>
+      <p:bldP spid="2" grpId="0"/>
     </p:bldLst>
   </p:timing>
 </p:sld>

</xml_diff>